<commit_message>
Update project06 - 파워포인트 종합 - 송우.pptx
</commit_message>
<xml_diff>
--- a/0 발표용 파워포인트/project06 - 파워포인트 종합 - 송우.pptx
+++ b/0 발표용 파워포인트/project06 - 파워포인트 종합 - 송우.pptx
@@ -5041,16 +5041,7 @@
                 </a:solidFill>
                 <a:latin typeface="+mn-ea"/>
               </a:rPr>
-              <a:t>공지사항 </a:t>
-            </a:r>
-            <a:r>
-              <a:rPr lang="ko-KR" altLang="en-US" dirty="0" smtClean="0">
-                <a:solidFill>
-                  <a:schemeClr val="tx1"/>
-                </a:solidFill>
-                <a:latin typeface="+mn-ea"/>
-              </a:rPr>
-              <a:t>상세</a:t>
+              <a:t>공지사항 상세</a:t>
             </a:r>
             <a:endParaRPr lang="en-US" altLang="ko-KR" dirty="0" smtClean="0">
               <a:solidFill>
@@ -5174,7 +5165,7 @@
           <p:cNvPr id="25" name="직사각형 24">
             <a:extLst>
               <a:ext uri="{FF2B5EF4-FFF2-40B4-BE49-F238E27FC236}">
-                <a16:creationId xmlns:a16="http://schemas.microsoft.com/office/drawing/2014/main" xmlns="" id="{7C9E9366-B86C-4147-AAEA-0E8C98D7DA95}"/>
+                <a16:creationId xmlns="" xmlns:a16="http://schemas.microsoft.com/office/drawing/2014/main" id="{7C9E9366-B86C-4147-AAEA-0E8C98D7DA95}"/>
               </a:ext>
             </a:extLst>
           </p:cNvPr>
@@ -5249,7 +5240,7 @@
                 <a:gridCol w="2688299">
                   <a:extLst>
                     <a:ext uri="{9D8B030D-6E8A-4147-A177-3AD203B41FA5}">
-                      <a16:colId xmlns:a16="http://schemas.microsoft.com/office/drawing/2014/main" xmlns="" val="20000"/>
+                      <a16:colId xmlns="" xmlns:a16="http://schemas.microsoft.com/office/drawing/2014/main" val="20000"/>
                     </a:ext>
                   </a:extLst>
                 </a:gridCol>
@@ -5281,7 +5272,7 @@
                 </a:tc>
                 <a:extLst>
                   <a:ext uri="{0D108BD9-81ED-4DB2-BD59-A6C34878D82A}">
-                    <a16:rowId xmlns:a16="http://schemas.microsoft.com/office/drawing/2014/main" xmlns="" val="10000"/>
+                    <a16:rowId xmlns="" xmlns:a16="http://schemas.microsoft.com/office/drawing/2014/main" val="10000"/>
                   </a:ext>
                 </a:extLst>
               </a:tr>
@@ -5344,7 +5335,7 @@
                 </a:tc>
                 <a:extLst>
                   <a:ext uri="{0D108BD9-81ED-4DB2-BD59-A6C34878D82A}">
-                    <a16:rowId xmlns:a16="http://schemas.microsoft.com/office/drawing/2014/main" xmlns="" val="10001"/>
+                    <a16:rowId xmlns="" xmlns:a16="http://schemas.microsoft.com/office/drawing/2014/main" val="10001"/>
                   </a:ext>
                 </a:extLst>
               </a:tr>
@@ -5360,7 +5351,7 @@
         </p:nvSpPr>
         <p:spPr>
           <a:xfrm>
-            <a:off x="7239827" y="5181602"/>
+            <a:off x="7239827" y="5317071"/>
             <a:ext cx="592666" cy="304800"/>
           </a:xfrm>
           <a:prstGeom prst="rect">
@@ -5421,14 +5412,14 @@
           <p:nvPr>
             <p:extLst>
               <p:ext uri="{D42A27DB-BD31-4B8C-83A1-F6EECF244321}">
-                <p14:modId xmlns:p14="http://schemas.microsoft.com/office/powerpoint/2010/main" val="4023973015"/>
+                <p14:modId xmlns:p14="http://schemas.microsoft.com/office/powerpoint/2010/main" val="1329520354"/>
               </p:ext>
             </p:extLst>
           </p:nvPr>
         </p:nvGraphicFramePr>
         <p:xfrm>
-          <a:off x="2257375" y="2573865"/>
-          <a:ext cx="5400000" cy="2459520"/>
+          <a:off x="2257375" y="2370664"/>
+          <a:ext cx="5400000" cy="2825280"/>
         </p:xfrm>
         <a:graphic>
           <a:graphicData uri="http://schemas.openxmlformats.org/drawingml/2006/table">
@@ -5669,7 +5660,7 @@
                       <a:pPr algn="ctr" latinLnBrk="1"/>
                       <a:r>
                         <a:rPr lang="ko-KR" altLang="en-US" dirty="0" smtClean="0"/>
-                        <a:t>제목</a:t>
+                        <a:t>중요</a:t>
                       </a:r>
                       <a:endParaRPr lang="ko-KR" altLang="en-US" dirty="0"/>
                     </a:p>
@@ -5721,10 +5712,10 @@
                     <a:bodyPr/>
                     <a:lstStyle/>
                     <a:p>
-                      <a:pPr latinLnBrk="1"/>
+                      <a:pPr algn="l" latinLnBrk="1"/>
                       <a:r>
-                        <a:rPr lang="ko-KR" altLang="en-US" sz="1400" dirty="0" smtClean="0"/>
-                        <a:t>공지사항 제목</a:t>
+                        <a:rPr lang="en-US" altLang="ko-KR" sz="1400" dirty="0" smtClean="0"/>
+                        <a:t>Y</a:t>
                       </a:r>
                       <a:endParaRPr lang="ko-KR" altLang="en-US" sz="1400" dirty="0"/>
                     </a:p>
@@ -5776,22 +5767,10 @@
                     <a:p>
                       <a:pPr algn="ctr" latinLnBrk="1"/>
                       <a:r>
-                        <a:rPr kumimoji="0" lang="ko-KR" altLang="en-US" sz="1800" b="0" i="0" u="none" strike="noStrike" kern="1200" cap="none" spc="0" normalizeH="0" baseline="0" noProof="0" dirty="0" smtClean="0">
-                          <a:ln>
-                            <a:noFill/>
-                          </a:ln>
-                          <a:solidFill>
-                            <a:prstClr val="black"/>
-                          </a:solidFill>
-                          <a:effectLst/>
-                          <a:uLnTx/>
-                          <a:uFillTx/>
-                          <a:latin typeface="+mn-lt"/>
-                          <a:ea typeface="+mn-ea"/>
-                        </a:rPr>
+                        <a:rPr lang="ko-KR" altLang="en-US" dirty="0" smtClean="0"/>
                         <a:t>작성자</a:t>
                       </a:r>
-                      <a:endParaRPr lang="ko-KR" altLang="en-US" sz="1400" dirty="0"/>
+                      <a:endParaRPr lang="ko-KR" altLang="en-US" dirty="0"/>
                     </a:p>
                   </a:txBody>
                   <a:tcPr anchor="ctr">
@@ -5890,6 +5869,220 @@
                   </a:tcPr>
                 </a:tc>
               </a:tr>
+              <a:tr h="360000">
+                <a:tc>
+                  <a:txBody>
+                    <a:bodyPr/>
+                    <a:lstStyle/>
+                    <a:p>
+                      <a:pPr algn="ctr" latinLnBrk="1"/>
+                      <a:r>
+                        <a:rPr lang="ko-KR" altLang="en-US" dirty="0" smtClean="0"/>
+                        <a:t>제목</a:t>
+                      </a:r>
+                      <a:endParaRPr lang="ko-KR" altLang="en-US" dirty="0"/>
+                    </a:p>
+                  </a:txBody>
+                  <a:tcPr anchor="ctr">
+                    <a:lnL w="12700" cap="flat" cmpd="sng" algn="ctr">
+                      <a:solidFill>
+                        <a:schemeClr val="tx1"/>
+                      </a:solidFill>
+                      <a:prstDash val="solid"/>
+                      <a:round/>
+                      <a:headEnd type="none" w="med" len="med"/>
+                      <a:tailEnd type="none" w="med" len="med"/>
+                    </a:lnL>
+                    <a:lnR w="12700" cap="flat" cmpd="sng" algn="ctr">
+                      <a:solidFill>
+                        <a:schemeClr val="tx1"/>
+                      </a:solidFill>
+                      <a:prstDash val="solid"/>
+                      <a:round/>
+                      <a:headEnd type="none" w="med" len="med"/>
+                      <a:tailEnd type="none" w="med" len="med"/>
+                    </a:lnR>
+                    <a:lnT w="12700" cap="flat" cmpd="sng" algn="ctr">
+                      <a:solidFill>
+                        <a:schemeClr val="tx1"/>
+                      </a:solidFill>
+                      <a:prstDash val="solid"/>
+                      <a:round/>
+                      <a:headEnd type="none" w="med" len="med"/>
+                      <a:tailEnd type="none" w="med" len="med"/>
+                    </a:lnT>
+                    <a:lnB w="12700" cap="flat" cmpd="sng" algn="ctr">
+                      <a:solidFill>
+                        <a:schemeClr val="tx1"/>
+                      </a:solidFill>
+                      <a:prstDash val="solid"/>
+                      <a:round/>
+                      <a:headEnd type="none" w="med" len="med"/>
+                      <a:tailEnd type="none" w="med" len="med"/>
+                    </a:lnB>
+                    <a:solidFill>
+                      <a:srgbClr val="FF9E00"/>
+                    </a:solidFill>
+                  </a:tcPr>
+                </a:tc>
+                <a:tc gridSpan="3">
+                  <a:txBody>
+                    <a:bodyPr/>
+                    <a:lstStyle/>
+                    <a:p>
+                      <a:pPr latinLnBrk="1"/>
+                      <a:r>
+                        <a:rPr lang="ko-KR" altLang="en-US" sz="1400" dirty="0" smtClean="0"/>
+                        <a:t>공지사항 </a:t>
+                      </a:r>
+                      <a:r>
+                        <a:rPr lang="ko-KR" altLang="en-US" sz="1400" dirty="0" smtClean="0"/>
+                        <a:t>제목</a:t>
+                      </a:r>
+                      <a:endParaRPr lang="ko-KR" altLang="en-US" sz="1400" dirty="0"/>
+                    </a:p>
+                  </a:txBody>
+                  <a:tcPr anchor="ctr">
+                    <a:lnL w="12700" cap="flat" cmpd="sng" algn="ctr">
+                      <a:solidFill>
+                        <a:schemeClr val="tx1"/>
+                      </a:solidFill>
+                      <a:prstDash val="solid"/>
+                      <a:round/>
+                      <a:headEnd type="none" w="med" len="med"/>
+                      <a:tailEnd type="none" w="med" len="med"/>
+                    </a:lnL>
+                    <a:lnR w="12700" cap="flat" cmpd="sng" algn="ctr">
+                      <a:solidFill>
+                        <a:schemeClr val="tx1"/>
+                      </a:solidFill>
+                      <a:prstDash val="solid"/>
+                      <a:round/>
+                      <a:headEnd type="none" w="med" len="med"/>
+                      <a:tailEnd type="none" w="med" len="med"/>
+                    </a:lnR>
+                    <a:lnT w="12700" cap="flat" cmpd="sng" algn="ctr">
+                      <a:solidFill>
+                        <a:schemeClr val="tx1"/>
+                      </a:solidFill>
+                      <a:prstDash val="solid"/>
+                      <a:round/>
+                      <a:headEnd type="none" w="med" len="med"/>
+                      <a:tailEnd type="none" w="med" len="med"/>
+                    </a:lnT>
+                    <a:lnB w="12700" cap="flat" cmpd="sng" algn="ctr">
+                      <a:solidFill>
+                        <a:schemeClr val="tx1"/>
+                      </a:solidFill>
+                      <a:prstDash val="solid"/>
+                      <a:round/>
+                      <a:headEnd type="none" w="med" len="med"/>
+                      <a:tailEnd type="none" w="med" len="med"/>
+                    </a:lnB>
+                    <a:noFill/>
+                  </a:tcPr>
+                </a:tc>
+                <a:tc hMerge="1">
+                  <a:txBody>
+                    <a:bodyPr/>
+                    <a:lstStyle/>
+                    <a:p>
+                      <a:pPr algn="ctr" latinLnBrk="1"/>
+                      <a:endParaRPr lang="ko-KR" altLang="en-US" sz="1400" dirty="0"/>
+                    </a:p>
+                  </a:txBody>
+                  <a:tcPr anchor="ctr">
+                    <a:lnL w="12700" cap="flat" cmpd="sng" algn="ctr">
+                      <a:solidFill>
+                        <a:schemeClr val="tx1"/>
+                      </a:solidFill>
+                      <a:prstDash val="solid"/>
+                      <a:round/>
+                      <a:headEnd type="none" w="med" len="med"/>
+                      <a:tailEnd type="none" w="med" len="med"/>
+                    </a:lnL>
+                    <a:lnR w="12700" cap="flat" cmpd="sng" algn="ctr">
+                      <a:solidFill>
+                        <a:schemeClr val="tx1"/>
+                      </a:solidFill>
+                      <a:prstDash val="solid"/>
+                      <a:round/>
+                      <a:headEnd type="none" w="med" len="med"/>
+                      <a:tailEnd type="none" w="med" len="med"/>
+                    </a:lnR>
+                    <a:lnT w="12700" cap="flat" cmpd="sng" algn="ctr">
+                      <a:solidFill>
+                        <a:schemeClr val="tx1"/>
+                      </a:solidFill>
+                      <a:prstDash val="solid"/>
+                      <a:round/>
+                      <a:headEnd type="none" w="med" len="med"/>
+                      <a:tailEnd type="none" w="med" len="med"/>
+                    </a:lnT>
+                    <a:lnB w="12700" cap="flat" cmpd="sng" algn="ctr">
+                      <a:solidFill>
+                        <a:schemeClr val="tx1"/>
+                      </a:solidFill>
+                      <a:prstDash val="solid"/>
+                      <a:round/>
+                      <a:headEnd type="none" w="med" len="med"/>
+                      <a:tailEnd type="none" w="med" len="med"/>
+                    </a:lnB>
+                    <a:solidFill>
+                      <a:srgbClr val="FF9E00"/>
+                    </a:solidFill>
+                  </a:tcPr>
+                </a:tc>
+                <a:tc hMerge="1">
+                  <a:txBody>
+                    <a:bodyPr/>
+                    <a:lstStyle/>
+                    <a:p>
+                      <a:pPr latinLnBrk="1"/>
+                      <a:endParaRPr lang="ko-KR" altLang="en-US" sz="1400" dirty="0"/>
+                    </a:p>
+                  </a:txBody>
+                  <a:tcPr anchor="ctr">
+                    <a:lnL w="12700" cap="flat" cmpd="sng" algn="ctr">
+                      <a:solidFill>
+                        <a:schemeClr val="tx1"/>
+                      </a:solidFill>
+                      <a:prstDash val="solid"/>
+                      <a:round/>
+                      <a:headEnd type="none" w="med" len="med"/>
+                      <a:tailEnd type="none" w="med" len="med"/>
+                    </a:lnL>
+                    <a:lnR w="12700" cap="flat" cmpd="sng" algn="ctr">
+                      <a:solidFill>
+                        <a:schemeClr val="tx1"/>
+                      </a:solidFill>
+                      <a:prstDash val="solid"/>
+                      <a:round/>
+                      <a:headEnd type="none" w="med" len="med"/>
+                      <a:tailEnd type="none" w="med" len="med"/>
+                    </a:lnR>
+                    <a:lnT w="12700" cap="flat" cmpd="sng" algn="ctr">
+                      <a:solidFill>
+                        <a:schemeClr val="tx1"/>
+                      </a:solidFill>
+                      <a:prstDash val="solid"/>
+                      <a:round/>
+                      <a:headEnd type="none" w="med" len="med"/>
+                      <a:tailEnd type="none" w="med" len="med"/>
+                    </a:lnT>
+                    <a:lnB w="12700" cap="flat" cmpd="sng" algn="ctr">
+                      <a:solidFill>
+                        <a:schemeClr val="tx1"/>
+                      </a:solidFill>
+                      <a:prstDash val="solid"/>
+                      <a:round/>
+                      <a:headEnd type="none" w="med" len="med"/>
+                      <a:tailEnd type="none" w="med" len="med"/>
+                    </a:lnB>
+                    <a:noFill/>
+                  </a:tcPr>
+                </a:tc>
+              </a:tr>
               <a:tr h="1728000">
                 <a:tc>
                   <a:txBody>
@@ -6114,7 +6307,7 @@
         </p:nvSpPr>
         <p:spPr>
           <a:xfrm>
-            <a:off x="5740401" y="5181602"/>
+            <a:off x="5740401" y="5317071"/>
             <a:ext cx="594000" cy="304800"/>
           </a:xfrm>
           <a:prstGeom prst="rect">
@@ -6192,14 +6385,14 @@
                 <a:gridCol w="280507">
                   <a:extLst>
                     <a:ext uri="{9D8B030D-6E8A-4147-A177-3AD203B41FA5}">
-                      <a16:colId xmlns:a16="http://schemas.microsoft.com/office/drawing/2014/main" xmlns="" val="20000"/>
+                      <a16:colId xmlns="" xmlns:a16="http://schemas.microsoft.com/office/drawing/2014/main" val="20000"/>
                     </a:ext>
                   </a:extLst>
                 </a:gridCol>
                 <a:gridCol w="2407792">
                   <a:extLst>
                     <a:ext uri="{9D8B030D-6E8A-4147-A177-3AD203B41FA5}">
-                      <a16:colId xmlns:a16="http://schemas.microsoft.com/office/drawing/2014/main" xmlns="" val="20001"/>
+                      <a16:colId xmlns="" xmlns:a16="http://schemas.microsoft.com/office/drawing/2014/main" val="20001"/>
                     </a:ext>
                   </a:extLst>
                 </a:gridCol>
@@ -6253,7 +6446,7 @@
                 </a:tc>
                 <a:extLst>
                   <a:ext uri="{0D108BD9-81ED-4DB2-BD59-A6C34878D82A}">
-                    <a16:rowId xmlns:a16="http://schemas.microsoft.com/office/drawing/2014/main" xmlns="" val="10000"/>
+                    <a16:rowId xmlns="" xmlns:a16="http://schemas.microsoft.com/office/drawing/2014/main" val="10000"/>
                   </a:ext>
                 </a:extLst>
               </a:tr>
@@ -6331,7 +6524,7 @@
                 </a:tc>
                 <a:extLst>
                   <a:ext uri="{0D108BD9-81ED-4DB2-BD59-A6C34878D82A}">
-                    <a16:rowId xmlns:a16="http://schemas.microsoft.com/office/drawing/2014/main" xmlns="" val="10001"/>
+                    <a16:rowId xmlns="" xmlns:a16="http://schemas.microsoft.com/office/drawing/2014/main" val="10001"/>
                   </a:ext>
                 </a:extLst>
               </a:tr>
@@ -6512,7 +6705,7 @@
                 </a:tc>
                 <a:extLst>
                   <a:ext uri="{0D108BD9-81ED-4DB2-BD59-A6C34878D82A}">
-                    <a16:rowId xmlns:a16="http://schemas.microsoft.com/office/drawing/2014/main" xmlns="" val="10002"/>
+                    <a16:rowId xmlns="" xmlns:a16="http://schemas.microsoft.com/office/drawing/2014/main" val="10002"/>
                   </a:ext>
                 </a:extLst>
               </a:tr>
@@ -6528,7 +6721,7 @@
         </p:nvSpPr>
         <p:spPr>
           <a:xfrm>
-            <a:off x="5864068" y="4811086"/>
+            <a:off x="5864068" y="4946555"/>
             <a:ext cx="346665" cy="289482"/>
           </a:xfrm>
           <a:prstGeom prst="rect">
@@ -6582,7 +6775,7 @@
         </p:nvSpPr>
         <p:spPr>
           <a:xfrm>
-            <a:off x="7435027" y="4811086"/>
+            <a:off x="7435027" y="4946555"/>
             <a:ext cx="346665" cy="289482"/>
           </a:xfrm>
           <a:prstGeom prst="rect">
@@ -6636,7 +6829,7 @@
         </p:nvSpPr>
         <p:spPr>
           <a:xfrm>
-            <a:off x="6493938" y="5181602"/>
+            <a:off x="6493938" y="5317071"/>
             <a:ext cx="594000" cy="304800"/>
           </a:xfrm>
           <a:prstGeom prst="rect">
@@ -6696,7 +6889,7 @@
         </p:nvSpPr>
         <p:spPr>
           <a:xfrm>
-            <a:off x="6617605" y="4811086"/>
+            <a:off x="6617605" y="4946555"/>
             <a:ext cx="346665" cy="289482"/>
           </a:xfrm>
           <a:prstGeom prst="rect">
@@ -7658,16 +7851,7 @@
                 </a:solidFill>
                 <a:latin typeface="+mn-ea"/>
               </a:rPr>
-              <a:t> </a:t>
-            </a:r>
-            <a:r>
-              <a:rPr lang="ko-KR" altLang="en-US" dirty="0" smtClean="0">
-                <a:solidFill>
-                  <a:schemeClr val="tx1"/>
-                </a:solidFill>
-                <a:latin typeface="+mn-ea"/>
-              </a:rPr>
-              <a:t>목록</a:t>
+              <a:t> 목록</a:t>
             </a:r>
             <a:endParaRPr lang="en-US" altLang="ko-KR" dirty="0" smtClean="0">
               <a:solidFill>
@@ -7791,7 +7975,7 @@
           <p:cNvPr id="25" name="직사각형 24">
             <a:extLst>
               <a:ext uri="{FF2B5EF4-FFF2-40B4-BE49-F238E27FC236}">
-                <a16:creationId xmlns:a16="http://schemas.microsoft.com/office/drawing/2014/main" xmlns="" id="{7C9E9366-B86C-4147-AAEA-0E8C98D7DA95}"/>
+                <a16:creationId xmlns="" xmlns:a16="http://schemas.microsoft.com/office/drawing/2014/main" id="{7C9E9366-B86C-4147-AAEA-0E8C98D7DA95}"/>
               </a:ext>
             </a:extLst>
           </p:cNvPr>
@@ -8022,7 +8206,7 @@
                 <a:gridCol w="2688299">
                   <a:extLst>
                     <a:ext uri="{9D8B030D-6E8A-4147-A177-3AD203B41FA5}">
-                      <a16:colId xmlns:a16="http://schemas.microsoft.com/office/drawing/2014/main" xmlns="" val="20000"/>
+                      <a16:colId xmlns="" xmlns:a16="http://schemas.microsoft.com/office/drawing/2014/main" val="20000"/>
                     </a:ext>
                   </a:extLst>
                 </a:gridCol>
@@ -8054,7 +8238,7 @@
                 </a:tc>
                 <a:extLst>
                   <a:ext uri="{0D108BD9-81ED-4DB2-BD59-A6C34878D82A}">
-                    <a16:rowId xmlns:a16="http://schemas.microsoft.com/office/drawing/2014/main" xmlns="" val="10000"/>
+                    <a16:rowId xmlns="" xmlns:a16="http://schemas.microsoft.com/office/drawing/2014/main" val="10000"/>
                   </a:ext>
                 </a:extLst>
               </a:tr>
@@ -8106,7 +8290,7 @@
                 </a:tc>
                 <a:extLst>
                   <a:ext uri="{0D108BD9-81ED-4DB2-BD59-A6C34878D82A}">
-                    <a16:rowId xmlns:a16="http://schemas.microsoft.com/office/drawing/2014/main" xmlns="" val="10001"/>
+                    <a16:rowId xmlns="" xmlns:a16="http://schemas.microsoft.com/office/drawing/2014/main" val="10001"/>
                   </a:ext>
                 </a:extLst>
               </a:tr>
@@ -9120,14 +9304,14 @@
                 <a:gridCol w="280507">
                   <a:extLst>
                     <a:ext uri="{9D8B030D-6E8A-4147-A177-3AD203B41FA5}">
-                      <a16:colId xmlns:a16="http://schemas.microsoft.com/office/drawing/2014/main" xmlns="" val="20000"/>
+                      <a16:colId xmlns="" xmlns:a16="http://schemas.microsoft.com/office/drawing/2014/main" val="20000"/>
                     </a:ext>
                   </a:extLst>
                 </a:gridCol>
                 <a:gridCol w="2407792">
                   <a:extLst>
                     <a:ext uri="{9D8B030D-6E8A-4147-A177-3AD203B41FA5}">
-                      <a16:colId xmlns:a16="http://schemas.microsoft.com/office/drawing/2014/main" xmlns="" val="20001"/>
+                      <a16:colId xmlns="" xmlns:a16="http://schemas.microsoft.com/office/drawing/2014/main" val="20001"/>
                     </a:ext>
                   </a:extLst>
                 </a:gridCol>
@@ -9181,7 +9365,7 @@
                 </a:tc>
                 <a:extLst>
                   <a:ext uri="{0D108BD9-81ED-4DB2-BD59-A6C34878D82A}">
-                    <a16:rowId xmlns:a16="http://schemas.microsoft.com/office/drawing/2014/main" xmlns="" val="10000"/>
+                    <a16:rowId xmlns="" xmlns:a16="http://schemas.microsoft.com/office/drawing/2014/main" val="10000"/>
                   </a:ext>
                 </a:extLst>
               </a:tr>
@@ -9290,7 +9474,7 @@
                 </a:tc>
                 <a:extLst>
                   <a:ext uri="{0D108BD9-81ED-4DB2-BD59-A6C34878D82A}">
-                    <a16:rowId xmlns:a16="http://schemas.microsoft.com/office/drawing/2014/main" xmlns="" val="10001"/>
+                    <a16:rowId xmlns="" xmlns:a16="http://schemas.microsoft.com/office/drawing/2014/main" val="10001"/>
                   </a:ext>
                 </a:extLst>
               </a:tr>
@@ -10602,7 +10786,7 @@
           <p:cNvPr id="25" name="직사각형 24">
             <a:extLst>
               <a:ext uri="{FF2B5EF4-FFF2-40B4-BE49-F238E27FC236}">
-                <a16:creationId xmlns:a16="http://schemas.microsoft.com/office/drawing/2014/main" xmlns="" id="{7C9E9366-B86C-4147-AAEA-0E8C98D7DA95}"/>
+                <a16:creationId xmlns="" xmlns:a16="http://schemas.microsoft.com/office/drawing/2014/main" id="{7C9E9366-B86C-4147-AAEA-0E8C98D7DA95}"/>
               </a:ext>
             </a:extLst>
           </p:cNvPr>
@@ -10677,7 +10861,7 @@
                 <a:gridCol w="2688299">
                   <a:extLst>
                     <a:ext uri="{9D8B030D-6E8A-4147-A177-3AD203B41FA5}">
-                      <a16:colId xmlns:a16="http://schemas.microsoft.com/office/drawing/2014/main" xmlns="" val="20000"/>
+                      <a16:colId xmlns="" xmlns:a16="http://schemas.microsoft.com/office/drawing/2014/main" val="20000"/>
                     </a:ext>
                   </a:extLst>
                 </a:gridCol>
@@ -10709,7 +10893,7 @@
                 </a:tc>
                 <a:extLst>
                   <a:ext uri="{0D108BD9-81ED-4DB2-BD59-A6C34878D82A}">
-                    <a16:rowId xmlns:a16="http://schemas.microsoft.com/office/drawing/2014/main" xmlns="" val="10000"/>
+                    <a16:rowId xmlns="" xmlns:a16="http://schemas.microsoft.com/office/drawing/2014/main" val="10000"/>
                   </a:ext>
                 </a:extLst>
               </a:tr>
@@ -10772,7 +10956,7 @@
                 </a:tc>
                 <a:extLst>
                   <a:ext uri="{0D108BD9-81ED-4DB2-BD59-A6C34878D82A}">
-                    <a16:rowId xmlns:a16="http://schemas.microsoft.com/office/drawing/2014/main" xmlns="" val="10001"/>
+                    <a16:rowId xmlns="" xmlns:a16="http://schemas.microsoft.com/office/drawing/2014/main" val="10001"/>
                   </a:ext>
                 </a:extLst>
               </a:tr>
@@ -11342,14 +11526,14 @@
                 <a:gridCol w="280507">
                   <a:extLst>
                     <a:ext uri="{9D8B030D-6E8A-4147-A177-3AD203B41FA5}">
-                      <a16:colId xmlns:a16="http://schemas.microsoft.com/office/drawing/2014/main" xmlns="" val="20000"/>
+                      <a16:colId xmlns="" xmlns:a16="http://schemas.microsoft.com/office/drawing/2014/main" val="20000"/>
                     </a:ext>
                   </a:extLst>
                 </a:gridCol>
                 <a:gridCol w="2407792">
                   <a:extLst>
                     <a:ext uri="{9D8B030D-6E8A-4147-A177-3AD203B41FA5}">
-                      <a16:colId xmlns:a16="http://schemas.microsoft.com/office/drawing/2014/main" xmlns="" val="20001"/>
+                      <a16:colId xmlns="" xmlns:a16="http://schemas.microsoft.com/office/drawing/2014/main" val="20001"/>
                     </a:ext>
                   </a:extLst>
                 </a:gridCol>
@@ -11403,7 +11587,7 @@
                 </a:tc>
                 <a:extLst>
                   <a:ext uri="{0D108BD9-81ED-4DB2-BD59-A6C34878D82A}">
-                    <a16:rowId xmlns:a16="http://schemas.microsoft.com/office/drawing/2014/main" xmlns="" val="10000"/>
+                    <a16:rowId xmlns="" xmlns:a16="http://schemas.microsoft.com/office/drawing/2014/main" val="10000"/>
                   </a:ext>
                 </a:extLst>
               </a:tr>
@@ -11488,7 +11672,7 @@
                 </a:tc>
                 <a:extLst>
                   <a:ext uri="{0D108BD9-81ED-4DB2-BD59-A6C34878D82A}">
-                    <a16:rowId xmlns:a16="http://schemas.microsoft.com/office/drawing/2014/main" xmlns="" val="10001"/>
+                    <a16:rowId xmlns="" xmlns:a16="http://schemas.microsoft.com/office/drawing/2014/main" val="10001"/>
                   </a:ext>
                 </a:extLst>
               </a:tr>
@@ -11593,7 +11777,7 @@
                 </a:tc>
                 <a:extLst>
                   <a:ext uri="{0D108BD9-81ED-4DB2-BD59-A6C34878D82A}">
-                    <a16:rowId xmlns:a16="http://schemas.microsoft.com/office/drawing/2014/main" xmlns="" val="10002"/>
+                    <a16:rowId xmlns="" xmlns:a16="http://schemas.microsoft.com/office/drawing/2014/main" val="10002"/>
                   </a:ext>
                 </a:extLst>
               </a:tr>
@@ -12749,7 +12933,7 @@
           <p:cNvPr id="25" name="직사각형 24">
             <a:extLst>
               <a:ext uri="{FF2B5EF4-FFF2-40B4-BE49-F238E27FC236}">
-                <a16:creationId xmlns:a16="http://schemas.microsoft.com/office/drawing/2014/main" xmlns="" id="{7C9E9366-B86C-4147-AAEA-0E8C98D7DA95}"/>
+                <a16:creationId xmlns="" xmlns:a16="http://schemas.microsoft.com/office/drawing/2014/main" id="{7C9E9366-B86C-4147-AAEA-0E8C98D7DA95}"/>
               </a:ext>
             </a:extLst>
           </p:cNvPr>
@@ -12824,7 +13008,7 @@
                 <a:gridCol w="2688299">
                   <a:extLst>
                     <a:ext uri="{9D8B030D-6E8A-4147-A177-3AD203B41FA5}">
-                      <a16:colId xmlns:a16="http://schemas.microsoft.com/office/drawing/2014/main" xmlns="" val="20000"/>
+                      <a16:colId xmlns="" xmlns:a16="http://schemas.microsoft.com/office/drawing/2014/main" val="20000"/>
                     </a:ext>
                   </a:extLst>
                 </a:gridCol>
@@ -12856,7 +13040,7 @@
                 </a:tc>
                 <a:extLst>
                   <a:ext uri="{0D108BD9-81ED-4DB2-BD59-A6C34878D82A}">
-                    <a16:rowId xmlns:a16="http://schemas.microsoft.com/office/drawing/2014/main" xmlns="" val="10000"/>
+                    <a16:rowId xmlns="" xmlns:a16="http://schemas.microsoft.com/office/drawing/2014/main" val="10000"/>
                   </a:ext>
                 </a:extLst>
               </a:tr>
@@ -12919,7 +13103,7 @@
                 </a:tc>
                 <a:extLst>
                   <a:ext uri="{0D108BD9-81ED-4DB2-BD59-A6C34878D82A}">
-                    <a16:rowId xmlns:a16="http://schemas.microsoft.com/office/drawing/2014/main" xmlns="" val="10001"/>
+                    <a16:rowId xmlns="" xmlns:a16="http://schemas.microsoft.com/office/drawing/2014/main" val="10001"/>
                   </a:ext>
                 </a:extLst>
               </a:tr>
@@ -13811,14 +13995,14 @@
                 <a:gridCol w="280507">
                   <a:extLst>
                     <a:ext uri="{9D8B030D-6E8A-4147-A177-3AD203B41FA5}">
-                      <a16:colId xmlns:a16="http://schemas.microsoft.com/office/drawing/2014/main" xmlns="" val="20000"/>
+                      <a16:colId xmlns="" xmlns:a16="http://schemas.microsoft.com/office/drawing/2014/main" val="20000"/>
                     </a:ext>
                   </a:extLst>
                 </a:gridCol>
                 <a:gridCol w="2407792">
                   <a:extLst>
                     <a:ext uri="{9D8B030D-6E8A-4147-A177-3AD203B41FA5}">
-                      <a16:colId xmlns:a16="http://schemas.microsoft.com/office/drawing/2014/main" xmlns="" val="20001"/>
+                      <a16:colId xmlns="" xmlns:a16="http://schemas.microsoft.com/office/drawing/2014/main" val="20001"/>
                     </a:ext>
                   </a:extLst>
                 </a:gridCol>
@@ -13872,7 +14056,7 @@
                 </a:tc>
                 <a:extLst>
                   <a:ext uri="{0D108BD9-81ED-4DB2-BD59-A6C34878D82A}">
-                    <a16:rowId xmlns:a16="http://schemas.microsoft.com/office/drawing/2014/main" xmlns="" val="10000"/>
+                    <a16:rowId xmlns="" xmlns:a16="http://schemas.microsoft.com/office/drawing/2014/main" val="10000"/>
                   </a:ext>
                 </a:extLst>
               </a:tr>
@@ -13969,19 +14153,7 @@
                           <a:cs typeface="Arial"/>
                           <a:sym typeface="Arial"/>
                         </a:rPr>
-                        <a:t> </a:t>
-                      </a:r>
-                      <a:r>
-                        <a:rPr lang="ko-KR" altLang="en-US" sz="1200" b="0" i="0" u="none" strike="noStrike" cap="none" dirty="0" smtClean="0">
-                          <a:solidFill>
-                            <a:srgbClr val="000000"/>
-                          </a:solidFill>
-                          <a:latin typeface="+mj-ea"/>
-                          <a:ea typeface="+mj-ea"/>
-                          <a:cs typeface="Arial"/>
-                          <a:sym typeface="Arial"/>
-                        </a:rPr>
-                        <a:t>수정</a:t>
+                        <a:t> 수정</a:t>
                       </a:r>
                       <a:endParaRPr lang="ko-KR" altLang="en-US" sz="1200" dirty="0">
                         <a:latin typeface="+mj-ea"/>
@@ -13993,7 +14165,7 @@
                 </a:tc>
                 <a:extLst>
                   <a:ext uri="{0D108BD9-81ED-4DB2-BD59-A6C34878D82A}">
-                    <a16:rowId xmlns:a16="http://schemas.microsoft.com/office/drawing/2014/main" xmlns="" val="10001"/>
+                    <a16:rowId xmlns="" xmlns:a16="http://schemas.microsoft.com/office/drawing/2014/main" val="10001"/>
                   </a:ext>
                 </a:extLst>
               </a:tr>
@@ -14105,19 +14277,7 @@
                           <a:cs typeface="Arial"/>
                           <a:sym typeface="Arial"/>
                         </a:rPr>
-                        <a:t>을 </a:t>
-                      </a:r>
-                      <a:r>
-                        <a:rPr lang="ko-KR" altLang="en-US" sz="1200" b="0" i="0" u="none" strike="noStrike" cap="none" dirty="0" smtClean="0">
-                          <a:solidFill>
-                            <a:srgbClr val="000000"/>
-                          </a:solidFill>
-                          <a:latin typeface="+mn-ea"/>
-                          <a:ea typeface="+mn-ea"/>
-                          <a:cs typeface="Arial"/>
-                          <a:sym typeface="Arial"/>
-                        </a:rPr>
-                        <a:t>삭제</a:t>
+                        <a:t>을 삭제</a:t>
                       </a:r>
                       <a:endParaRPr lang="ko-KR" altLang="en-US" sz="1200" b="0" i="0" u="none" strike="noStrike" cap="none" dirty="0">
                         <a:solidFill>
@@ -14229,19 +14389,7 @@
                           <a:cs typeface="Arial"/>
                           <a:sym typeface="Arial"/>
                         </a:rPr>
-                        <a:t> </a:t>
-                      </a:r>
-                      <a:r>
-                        <a:rPr lang="ko-KR" altLang="en-US" sz="1200" b="0" i="0" u="none" strike="noStrike" cap="none" dirty="0" smtClean="0">
-                          <a:solidFill>
-                            <a:srgbClr val="000000"/>
-                          </a:solidFill>
-                          <a:latin typeface="+mn-ea"/>
-                          <a:ea typeface="+mn-ea"/>
-                          <a:cs typeface="Arial"/>
-                          <a:sym typeface="Arial"/>
-                        </a:rPr>
-                        <a:t>목록으로 이동</a:t>
+                        <a:t> 목록으로 이동</a:t>
                       </a:r>
                       <a:endParaRPr lang="ko-KR" altLang="en-US" sz="1200" b="0" i="0" u="none" strike="noStrike" cap="none" dirty="0">
                         <a:solidFill>
@@ -14258,7 +14406,7 @@
                 </a:tc>
                 <a:extLst>
                   <a:ext uri="{0D108BD9-81ED-4DB2-BD59-A6C34878D82A}">
-                    <a16:rowId xmlns:a16="http://schemas.microsoft.com/office/drawing/2014/main" xmlns="" val="10002"/>
+                    <a16:rowId xmlns="" xmlns:a16="http://schemas.microsoft.com/office/drawing/2014/main" val="10002"/>
                   </a:ext>
                 </a:extLst>
               </a:tr>
@@ -15637,7 +15785,7 @@
           <p:cNvPr id="25" name="직사각형 24">
             <a:extLst>
               <a:ext uri="{FF2B5EF4-FFF2-40B4-BE49-F238E27FC236}">
-                <a16:creationId xmlns:a16="http://schemas.microsoft.com/office/drawing/2014/main" xmlns="" id="{7C9E9366-B86C-4147-AAEA-0E8C98D7DA95}"/>
+                <a16:creationId xmlns="" xmlns:a16="http://schemas.microsoft.com/office/drawing/2014/main" id="{7C9E9366-B86C-4147-AAEA-0E8C98D7DA95}"/>
               </a:ext>
             </a:extLst>
           </p:cNvPr>
@@ -15881,7 +16029,7 @@
                 <a:gridCol w="2688299">
                   <a:extLst>
                     <a:ext uri="{9D8B030D-6E8A-4147-A177-3AD203B41FA5}">
-                      <a16:colId xmlns:a16="http://schemas.microsoft.com/office/drawing/2014/main" xmlns="" val="20000"/>
+                      <a16:colId xmlns="" xmlns:a16="http://schemas.microsoft.com/office/drawing/2014/main" val="20000"/>
                     </a:ext>
                   </a:extLst>
                 </a:gridCol>
@@ -15913,7 +16061,7 @@
                 </a:tc>
                 <a:extLst>
                   <a:ext uri="{0D108BD9-81ED-4DB2-BD59-A6C34878D82A}">
-                    <a16:rowId xmlns:a16="http://schemas.microsoft.com/office/drawing/2014/main" xmlns="" val="10000"/>
+                    <a16:rowId xmlns="" xmlns:a16="http://schemas.microsoft.com/office/drawing/2014/main" val="10000"/>
                   </a:ext>
                 </a:extLst>
               </a:tr>
@@ -15965,7 +16113,7 @@
                 </a:tc>
                 <a:extLst>
                   <a:ext uri="{0D108BD9-81ED-4DB2-BD59-A6C34878D82A}">
-                    <a16:rowId xmlns:a16="http://schemas.microsoft.com/office/drawing/2014/main" xmlns="" val="10001"/>
+                    <a16:rowId xmlns="" xmlns:a16="http://schemas.microsoft.com/office/drawing/2014/main" val="10001"/>
                   </a:ext>
                 </a:extLst>
               </a:tr>
@@ -16918,14 +17066,14 @@
                 <a:gridCol w="280507">
                   <a:extLst>
                     <a:ext uri="{9D8B030D-6E8A-4147-A177-3AD203B41FA5}">
-                      <a16:colId xmlns:a16="http://schemas.microsoft.com/office/drawing/2014/main" xmlns="" val="20000"/>
+                      <a16:colId xmlns="" xmlns:a16="http://schemas.microsoft.com/office/drawing/2014/main" val="20000"/>
                     </a:ext>
                   </a:extLst>
                 </a:gridCol>
                 <a:gridCol w="2407792">
                   <a:extLst>
                     <a:ext uri="{9D8B030D-6E8A-4147-A177-3AD203B41FA5}">
-                      <a16:colId xmlns:a16="http://schemas.microsoft.com/office/drawing/2014/main" xmlns="" val="20001"/>
+                      <a16:colId xmlns="" xmlns:a16="http://schemas.microsoft.com/office/drawing/2014/main" val="20001"/>
                     </a:ext>
                   </a:extLst>
                 </a:gridCol>
@@ -16979,7 +17127,7 @@
                 </a:tc>
                 <a:extLst>
                   <a:ext uri="{0D108BD9-81ED-4DB2-BD59-A6C34878D82A}">
-                    <a16:rowId xmlns:a16="http://schemas.microsoft.com/office/drawing/2014/main" xmlns="" val="10000"/>
+                    <a16:rowId xmlns="" xmlns:a16="http://schemas.microsoft.com/office/drawing/2014/main" val="10000"/>
                   </a:ext>
                 </a:extLst>
               </a:tr>
@@ -17057,7 +17205,7 @@
                 </a:tc>
                 <a:extLst>
                   <a:ext uri="{0D108BD9-81ED-4DB2-BD59-A6C34878D82A}">
-                    <a16:rowId xmlns:a16="http://schemas.microsoft.com/office/drawing/2014/main" xmlns="" val="10001"/>
+                    <a16:rowId xmlns="" xmlns:a16="http://schemas.microsoft.com/office/drawing/2014/main" val="10001"/>
                   </a:ext>
                 </a:extLst>
               </a:tr>
@@ -18124,7 +18272,7 @@
           <p:cNvPr id="25" name="직사각형 24">
             <a:extLst>
               <a:ext uri="{FF2B5EF4-FFF2-40B4-BE49-F238E27FC236}">
-                <a16:creationId xmlns:a16="http://schemas.microsoft.com/office/drawing/2014/main" xmlns="" id="{7C9E9366-B86C-4147-AAEA-0E8C98D7DA95}"/>
+                <a16:creationId xmlns="" xmlns:a16="http://schemas.microsoft.com/office/drawing/2014/main" id="{7C9E9366-B86C-4147-AAEA-0E8C98D7DA95}"/>
               </a:ext>
             </a:extLst>
           </p:cNvPr>
@@ -19317,7 +19465,7 @@
                 <a:gridCol w="2688299">
                   <a:extLst>
                     <a:ext uri="{9D8B030D-6E8A-4147-A177-3AD203B41FA5}">
-                      <a16:colId xmlns:a16="http://schemas.microsoft.com/office/drawing/2014/main" xmlns="" val="20000"/>
+                      <a16:colId xmlns="" xmlns:a16="http://schemas.microsoft.com/office/drawing/2014/main" val="20000"/>
                     </a:ext>
                   </a:extLst>
                 </a:gridCol>
@@ -19349,7 +19497,7 @@
                 </a:tc>
                 <a:extLst>
                   <a:ext uri="{0D108BD9-81ED-4DB2-BD59-A6C34878D82A}">
-                    <a16:rowId xmlns:a16="http://schemas.microsoft.com/office/drawing/2014/main" xmlns="" val="10000"/>
+                    <a16:rowId xmlns="" xmlns:a16="http://schemas.microsoft.com/office/drawing/2014/main" val="10000"/>
                   </a:ext>
                 </a:extLst>
               </a:tr>
@@ -19401,7 +19549,7 @@
                 </a:tc>
                 <a:extLst>
                   <a:ext uri="{0D108BD9-81ED-4DB2-BD59-A6C34878D82A}">
-                    <a16:rowId xmlns:a16="http://schemas.microsoft.com/office/drawing/2014/main" xmlns="" val="10001"/>
+                    <a16:rowId xmlns="" xmlns:a16="http://schemas.microsoft.com/office/drawing/2014/main" val="10001"/>
                   </a:ext>
                 </a:extLst>
               </a:tr>
@@ -20912,14 +21060,14 @@
                 <a:gridCol w="280507">
                   <a:extLst>
                     <a:ext uri="{9D8B030D-6E8A-4147-A177-3AD203B41FA5}">
-                      <a16:colId xmlns:a16="http://schemas.microsoft.com/office/drawing/2014/main" xmlns="" val="20000"/>
+                      <a16:colId xmlns="" xmlns:a16="http://schemas.microsoft.com/office/drawing/2014/main" val="20000"/>
                     </a:ext>
                   </a:extLst>
                 </a:gridCol>
                 <a:gridCol w="2407792">
                   <a:extLst>
                     <a:ext uri="{9D8B030D-6E8A-4147-A177-3AD203B41FA5}">
-                      <a16:colId xmlns:a16="http://schemas.microsoft.com/office/drawing/2014/main" xmlns="" val="20001"/>
+                      <a16:colId xmlns="" xmlns:a16="http://schemas.microsoft.com/office/drawing/2014/main" val="20001"/>
                     </a:ext>
                   </a:extLst>
                 </a:gridCol>
@@ -20973,7 +21121,7 @@
                 </a:tc>
                 <a:extLst>
                   <a:ext uri="{0D108BD9-81ED-4DB2-BD59-A6C34878D82A}">
-                    <a16:rowId xmlns:a16="http://schemas.microsoft.com/office/drawing/2014/main" xmlns="" val="10000"/>
+                    <a16:rowId xmlns="" xmlns:a16="http://schemas.microsoft.com/office/drawing/2014/main" val="10000"/>
                   </a:ext>
                 </a:extLst>
               </a:tr>
@@ -21075,7 +21223,7 @@
                 </a:tc>
                 <a:extLst>
                   <a:ext uri="{0D108BD9-81ED-4DB2-BD59-A6C34878D82A}">
-                    <a16:rowId xmlns:a16="http://schemas.microsoft.com/office/drawing/2014/main" xmlns="" val="10001"/>
+                    <a16:rowId xmlns="" xmlns:a16="http://schemas.microsoft.com/office/drawing/2014/main" val="10001"/>
                   </a:ext>
                 </a:extLst>
               </a:tr>
@@ -21180,7 +21328,7 @@
                 </a:tc>
                 <a:extLst>
                   <a:ext uri="{0D108BD9-81ED-4DB2-BD59-A6C34878D82A}">
-                    <a16:rowId xmlns:a16="http://schemas.microsoft.com/office/drawing/2014/main" xmlns="" val="10002"/>
+                    <a16:rowId xmlns="" xmlns:a16="http://schemas.microsoft.com/office/drawing/2014/main" val="10002"/>
                   </a:ext>
                 </a:extLst>
               </a:tr>
@@ -22180,7 +22328,7 @@
                 <a:gridCol w="2688299">
                   <a:extLst>
                     <a:ext uri="{9D8B030D-6E8A-4147-A177-3AD203B41FA5}">
-                      <a16:colId xmlns:a16="http://schemas.microsoft.com/office/drawing/2014/main" xmlns="" val="20000"/>
+                      <a16:colId xmlns="" xmlns:a16="http://schemas.microsoft.com/office/drawing/2014/main" val="20000"/>
                     </a:ext>
                   </a:extLst>
                 </a:gridCol>
@@ -22212,7 +22360,7 @@
                 </a:tc>
                 <a:extLst>
                   <a:ext uri="{0D108BD9-81ED-4DB2-BD59-A6C34878D82A}">
-                    <a16:rowId xmlns:a16="http://schemas.microsoft.com/office/drawing/2014/main" xmlns="" val="10000"/>
+                    <a16:rowId xmlns="" xmlns:a16="http://schemas.microsoft.com/office/drawing/2014/main" val="10000"/>
                   </a:ext>
                 </a:extLst>
               </a:tr>
@@ -22240,7 +22388,7 @@
                 </a:tc>
                 <a:extLst>
                   <a:ext uri="{0D108BD9-81ED-4DB2-BD59-A6C34878D82A}">
-                    <a16:rowId xmlns:a16="http://schemas.microsoft.com/office/drawing/2014/main" xmlns="" val="10001"/>
+                    <a16:rowId xmlns="" xmlns:a16="http://schemas.microsoft.com/office/drawing/2014/main" val="10001"/>
                   </a:ext>
                 </a:extLst>
               </a:tr>
@@ -22322,14 +22470,14 @@
                 <a:gridCol w="280507">
                   <a:extLst>
                     <a:ext uri="{9D8B030D-6E8A-4147-A177-3AD203B41FA5}">
-                      <a16:colId xmlns:a16="http://schemas.microsoft.com/office/drawing/2014/main" xmlns="" val="20000"/>
+                      <a16:colId xmlns="" xmlns:a16="http://schemas.microsoft.com/office/drawing/2014/main" val="20000"/>
                     </a:ext>
                   </a:extLst>
                 </a:gridCol>
                 <a:gridCol w="2407792">
                   <a:extLst>
                     <a:ext uri="{9D8B030D-6E8A-4147-A177-3AD203B41FA5}">
-                      <a16:colId xmlns:a16="http://schemas.microsoft.com/office/drawing/2014/main" xmlns="" val="20001"/>
+                      <a16:colId xmlns="" xmlns:a16="http://schemas.microsoft.com/office/drawing/2014/main" val="20001"/>
                     </a:ext>
                   </a:extLst>
                 </a:gridCol>
@@ -22383,7 +22531,7 @@
                 </a:tc>
                 <a:extLst>
                   <a:ext uri="{0D108BD9-81ED-4DB2-BD59-A6C34878D82A}">
-                    <a16:rowId xmlns:a16="http://schemas.microsoft.com/office/drawing/2014/main" xmlns="" val="10000"/>
+                    <a16:rowId xmlns="" xmlns:a16="http://schemas.microsoft.com/office/drawing/2014/main" val="10000"/>
                   </a:ext>
                 </a:extLst>
               </a:tr>
@@ -22485,7 +22633,7 @@
                 </a:tc>
                 <a:extLst>
                   <a:ext uri="{0D108BD9-81ED-4DB2-BD59-A6C34878D82A}">
-                    <a16:rowId xmlns:a16="http://schemas.microsoft.com/office/drawing/2014/main" xmlns="" val="10001"/>
+                    <a16:rowId xmlns="" xmlns:a16="http://schemas.microsoft.com/office/drawing/2014/main" val="10001"/>
                   </a:ext>
                 </a:extLst>
               </a:tr>
@@ -22583,7 +22731,7 @@
           <p:cNvPr id="3" name="직사각형 2">
             <a:extLst>
               <a:ext uri="{FF2B5EF4-FFF2-40B4-BE49-F238E27FC236}">
-                <a16:creationId xmlns:a16="http://schemas.microsoft.com/office/drawing/2014/main" xmlns="" id="{7C9E9366-B86C-4147-AAEA-0E8C98D7DA95}"/>
+                <a16:creationId xmlns="" xmlns:a16="http://schemas.microsoft.com/office/drawing/2014/main" id="{7C9E9366-B86C-4147-AAEA-0E8C98D7DA95}"/>
               </a:ext>
             </a:extLst>
           </p:cNvPr>
@@ -22865,7 +23013,7 @@
           <p:nvPr>
             <p:extLst>
               <p:ext uri="{D42A27DB-BD31-4B8C-83A1-F6EECF244321}">
-                <p14:modId xmlns:p14="http://schemas.microsoft.com/office/powerpoint/2010/main" val="1629192107"/>
+                <p14:modId xmlns:p14="http://schemas.microsoft.com/office/powerpoint/2010/main" val="654728751"/>
               </p:ext>
             </p:extLst>
           </p:nvPr>
@@ -23117,7 +23265,7 @@
                       <a:pPr algn="ctr" latinLnBrk="1"/>
                       <a:r>
                         <a:rPr lang="ko-KR" altLang="en-US" sz="1600" dirty="0" smtClean="0"/>
-                        <a:t>신규</a:t>
+                        <a:t>중요</a:t>
                       </a:r>
                       <a:endParaRPr lang="ko-KR" altLang="en-US" sz="1600" dirty="0"/>
                     </a:p>
@@ -23492,7 +23640,7 @@
                       <a:pPr algn="ctr" latinLnBrk="1"/>
                       <a:r>
                         <a:rPr lang="ko-KR" altLang="en-US" sz="1600" dirty="0" smtClean="0"/>
-                        <a:t>신규</a:t>
+                        <a:t>중요</a:t>
                       </a:r>
                       <a:endParaRPr lang="ko-KR" altLang="en-US" sz="1600" dirty="0"/>
                     </a:p>
@@ -23702,7 +23850,7 @@
                       <a:pPr algn="ctr" latinLnBrk="1"/>
                       <a:r>
                         <a:rPr lang="en-US" altLang="ko-KR" sz="1600" dirty="0" smtClean="0"/>
-                        <a:t>3</a:t>
+                        <a:t>1</a:t>
                       </a:r>
                       <a:endParaRPr lang="ko-KR" altLang="en-US" sz="1600" dirty="0"/>
                     </a:p>
@@ -23912,7 +24060,7 @@
                       <a:pPr algn="ctr" latinLnBrk="1"/>
                       <a:r>
                         <a:rPr lang="en-US" altLang="ko-KR" sz="1600" dirty="0" smtClean="0"/>
-                        <a:t>4</a:t>
+                        <a:t>2</a:t>
                       </a:r>
                       <a:endParaRPr lang="ko-KR" altLang="en-US" sz="1600" dirty="0"/>
                     </a:p>
@@ -25322,7 +25470,7 @@
                 <a:gridCol w="2688299">
                   <a:extLst>
                     <a:ext uri="{9D8B030D-6E8A-4147-A177-3AD203B41FA5}">
-                      <a16:colId xmlns:a16="http://schemas.microsoft.com/office/drawing/2014/main" xmlns="" val="20000"/>
+                      <a16:colId xmlns="" xmlns:a16="http://schemas.microsoft.com/office/drawing/2014/main" val="20000"/>
                     </a:ext>
                   </a:extLst>
                 </a:gridCol>
@@ -25354,7 +25502,7 @@
                 </a:tc>
                 <a:extLst>
                   <a:ext uri="{0D108BD9-81ED-4DB2-BD59-A6C34878D82A}">
-                    <a16:rowId xmlns:a16="http://schemas.microsoft.com/office/drawing/2014/main" xmlns="" val="10000"/>
+                    <a16:rowId xmlns="" xmlns:a16="http://schemas.microsoft.com/office/drawing/2014/main" val="10000"/>
                   </a:ext>
                 </a:extLst>
               </a:tr>
@@ -25382,7 +25530,7 @@
                 </a:tc>
                 <a:extLst>
                   <a:ext uri="{0D108BD9-81ED-4DB2-BD59-A6C34878D82A}">
-                    <a16:rowId xmlns:a16="http://schemas.microsoft.com/office/drawing/2014/main" xmlns="" val="10001"/>
+                    <a16:rowId xmlns="" xmlns:a16="http://schemas.microsoft.com/office/drawing/2014/main" val="10001"/>
                   </a:ext>
                 </a:extLst>
               </a:tr>
@@ -25460,14 +25608,14 @@
                 <a:gridCol w="280507">
                   <a:extLst>
                     <a:ext uri="{9D8B030D-6E8A-4147-A177-3AD203B41FA5}">
-                      <a16:colId xmlns:a16="http://schemas.microsoft.com/office/drawing/2014/main" xmlns="" val="20000"/>
+                      <a16:colId xmlns="" xmlns:a16="http://schemas.microsoft.com/office/drawing/2014/main" val="20000"/>
                     </a:ext>
                   </a:extLst>
                 </a:gridCol>
                 <a:gridCol w="2407792">
                   <a:extLst>
                     <a:ext uri="{9D8B030D-6E8A-4147-A177-3AD203B41FA5}">
-                      <a16:colId xmlns:a16="http://schemas.microsoft.com/office/drawing/2014/main" xmlns="" val="20001"/>
+                      <a16:colId xmlns="" xmlns:a16="http://schemas.microsoft.com/office/drawing/2014/main" val="20001"/>
                     </a:ext>
                   </a:extLst>
                 </a:gridCol>
@@ -25521,7 +25669,7 @@
                 </a:tc>
                 <a:extLst>
                   <a:ext uri="{0D108BD9-81ED-4DB2-BD59-A6C34878D82A}">
-                    <a16:rowId xmlns:a16="http://schemas.microsoft.com/office/drawing/2014/main" xmlns="" val="10000"/>
+                    <a16:rowId xmlns="" xmlns:a16="http://schemas.microsoft.com/office/drawing/2014/main" val="10000"/>
                   </a:ext>
                 </a:extLst>
               </a:tr>
@@ -25623,7 +25771,7 @@
                 </a:tc>
                 <a:extLst>
                   <a:ext uri="{0D108BD9-81ED-4DB2-BD59-A6C34878D82A}">
-                    <a16:rowId xmlns:a16="http://schemas.microsoft.com/office/drawing/2014/main" xmlns="" val="10001"/>
+                    <a16:rowId xmlns="" xmlns:a16="http://schemas.microsoft.com/office/drawing/2014/main" val="10001"/>
                   </a:ext>
                 </a:extLst>
               </a:tr>
@@ -25721,7 +25869,7 @@
           <p:cNvPr id="3" name="직사각형 2">
             <a:extLst>
               <a:ext uri="{FF2B5EF4-FFF2-40B4-BE49-F238E27FC236}">
-                <a16:creationId xmlns:a16="http://schemas.microsoft.com/office/drawing/2014/main" xmlns="" id="{7C9E9366-B86C-4147-AAEA-0E8C98D7DA95}"/>
+                <a16:creationId xmlns="" xmlns:a16="http://schemas.microsoft.com/office/drawing/2014/main" id="{7C9E9366-B86C-4147-AAEA-0E8C98D7DA95}"/>
               </a:ext>
             </a:extLst>
           </p:cNvPr>
@@ -26003,7 +26151,7 @@
           <p:nvPr>
             <p:extLst>
               <p:ext uri="{D42A27DB-BD31-4B8C-83A1-F6EECF244321}">
-                <p14:modId xmlns:p14="http://schemas.microsoft.com/office/powerpoint/2010/main" val="3410768365"/>
+                <p14:modId xmlns:p14="http://schemas.microsoft.com/office/powerpoint/2010/main" val="2065317909"/>
               </p:ext>
             </p:extLst>
           </p:nvPr>
@@ -26255,7 +26403,7 @@
                       <a:pPr algn="ctr" latinLnBrk="1"/>
                       <a:r>
                         <a:rPr lang="ko-KR" altLang="en-US" sz="1050" dirty="0" smtClean="0"/>
-                        <a:t>신규</a:t>
+                        <a:t>중요</a:t>
                       </a:r>
                       <a:endParaRPr lang="ko-KR" altLang="en-US" sz="1050" dirty="0"/>
                     </a:p>
@@ -26556,7 +26704,7 @@
                       <a:pPr algn="ctr" latinLnBrk="1"/>
                       <a:r>
                         <a:rPr lang="ko-KR" altLang="en-US" sz="1050" dirty="0" smtClean="0"/>
-                        <a:t>신규</a:t>
+                        <a:t>중요</a:t>
                       </a:r>
                       <a:endParaRPr lang="ko-KR" altLang="en-US" sz="1050" dirty="0"/>
                     </a:p>
@@ -26766,7 +26914,7 @@
                       <a:pPr algn="ctr" latinLnBrk="1"/>
                       <a:r>
                         <a:rPr lang="en-US" altLang="ko-KR" sz="1050" dirty="0" smtClean="0"/>
-                        <a:t>3</a:t>
+                        <a:t>1</a:t>
                       </a:r>
                       <a:endParaRPr lang="ko-KR" altLang="en-US" sz="1050" dirty="0"/>
                     </a:p>
@@ -26976,7 +27124,7 @@
                       <a:pPr algn="ctr" latinLnBrk="1"/>
                       <a:r>
                         <a:rPr lang="en-US" altLang="ko-KR" sz="1050" dirty="0" smtClean="0"/>
-                        <a:t>4</a:t>
+                        <a:t>2</a:t>
                       </a:r>
                       <a:endParaRPr lang="ko-KR" altLang="en-US" sz="1050" dirty="0"/>
                     </a:p>
@@ -28399,7 +28547,7 @@
                 <a:gridCol w="2688299">
                   <a:extLst>
                     <a:ext uri="{9D8B030D-6E8A-4147-A177-3AD203B41FA5}">
-                      <a16:colId xmlns:a16="http://schemas.microsoft.com/office/drawing/2014/main" xmlns="" val="20000"/>
+                      <a16:colId xmlns="" xmlns:a16="http://schemas.microsoft.com/office/drawing/2014/main" val="20000"/>
                     </a:ext>
                   </a:extLst>
                 </a:gridCol>
@@ -28431,7 +28579,7 @@
                 </a:tc>
                 <a:extLst>
                   <a:ext uri="{0D108BD9-81ED-4DB2-BD59-A6C34878D82A}">
-                    <a16:rowId xmlns:a16="http://schemas.microsoft.com/office/drawing/2014/main" xmlns="" val="10000"/>
+                    <a16:rowId xmlns="" xmlns:a16="http://schemas.microsoft.com/office/drawing/2014/main" val="10000"/>
                   </a:ext>
                 </a:extLst>
               </a:tr>
@@ -28459,7 +28607,7 @@
                 </a:tc>
                 <a:extLst>
                   <a:ext uri="{0D108BD9-81ED-4DB2-BD59-A6C34878D82A}">
-                    <a16:rowId xmlns:a16="http://schemas.microsoft.com/office/drawing/2014/main" xmlns="" val="10001"/>
+                    <a16:rowId xmlns="" xmlns:a16="http://schemas.microsoft.com/office/drawing/2014/main" val="10001"/>
                   </a:ext>
                 </a:extLst>
               </a:tr>
@@ -28520,7 +28668,7 @@
           <p:cNvPr id="3" name="직사각형 2">
             <a:extLst>
               <a:ext uri="{FF2B5EF4-FFF2-40B4-BE49-F238E27FC236}">
-                <a16:creationId xmlns:a16="http://schemas.microsoft.com/office/drawing/2014/main" xmlns="" id="{7C9E9366-B86C-4147-AAEA-0E8C98D7DA95}"/>
+                <a16:creationId xmlns="" xmlns:a16="http://schemas.microsoft.com/office/drawing/2014/main" id="{7C9E9366-B86C-4147-AAEA-0E8C98D7DA95}"/>
               </a:ext>
             </a:extLst>
           </p:cNvPr>
@@ -29933,14 +30081,14 @@
                 <a:gridCol w="280507">
                   <a:extLst>
                     <a:ext uri="{9D8B030D-6E8A-4147-A177-3AD203B41FA5}">
-                      <a16:colId xmlns:a16="http://schemas.microsoft.com/office/drawing/2014/main" xmlns="" val="20000"/>
+                      <a16:colId xmlns="" xmlns:a16="http://schemas.microsoft.com/office/drawing/2014/main" val="20000"/>
                     </a:ext>
                   </a:extLst>
                 </a:gridCol>
                 <a:gridCol w="2407792">
                   <a:extLst>
                     <a:ext uri="{9D8B030D-6E8A-4147-A177-3AD203B41FA5}">
-                      <a16:colId xmlns:a16="http://schemas.microsoft.com/office/drawing/2014/main" xmlns="" val="20001"/>
+                      <a16:colId xmlns="" xmlns:a16="http://schemas.microsoft.com/office/drawing/2014/main" val="20001"/>
                     </a:ext>
                   </a:extLst>
                 </a:gridCol>
@@ -29994,7 +30142,7 @@
                 </a:tc>
                 <a:extLst>
                   <a:ext uri="{0D108BD9-81ED-4DB2-BD59-A6C34878D82A}">
-                    <a16:rowId xmlns:a16="http://schemas.microsoft.com/office/drawing/2014/main" xmlns="" val="10000"/>
+                    <a16:rowId xmlns="" xmlns:a16="http://schemas.microsoft.com/office/drawing/2014/main" val="10000"/>
                   </a:ext>
                 </a:extLst>
               </a:tr>
@@ -30139,7 +30287,7 @@
                 </a:tc>
                 <a:extLst>
                   <a:ext uri="{0D108BD9-81ED-4DB2-BD59-A6C34878D82A}">
-                    <a16:rowId xmlns:a16="http://schemas.microsoft.com/office/drawing/2014/main" xmlns="" val="10001"/>
+                    <a16:rowId xmlns="" xmlns:a16="http://schemas.microsoft.com/office/drawing/2014/main" val="10001"/>
                   </a:ext>
                 </a:extLst>
               </a:tr>
@@ -31462,7 +31610,7 @@
                 <a:gridCol w="2688299">
                   <a:extLst>
                     <a:ext uri="{9D8B030D-6E8A-4147-A177-3AD203B41FA5}">
-                      <a16:colId xmlns:a16="http://schemas.microsoft.com/office/drawing/2014/main" xmlns="" val="20000"/>
+                      <a16:colId xmlns="" xmlns:a16="http://schemas.microsoft.com/office/drawing/2014/main" val="20000"/>
                     </a:ext>
                   </a:extLst>
                 </a:gridCol>
@@ -31494,7 +31642,7 @@
                 </a:tc>
                 <a:extLst>
                   <a:ext uri="{0D108BD9-81ED-4DB2-BD59-A6C34878D82A}">
-                    <a16:rowId xmlns:a16="http://schemas.microsoft.com/office/drawing/2014/main" xmlns="" val="10000"/>
+                    <a16:rowId xmlns="" xmlns:a16="http://schemas.microsoft.com/office/drawing/2014/main" val="10000"/>
                   </a:ext>
                 </a:extLst>
               </a:tr>
@@ -31522,7 +31670,7 @@
                 </a:tc>
                 <a:extLst>
                   <a:ext uri="{0D108BD9-81ED-4DB2-BD59-A6C34878D82A}">
-                    <a16:rowId xmlns:a16="http://schemas.microsoft.com/office/drawing/2014/main" xmlns="" val="10001"/>
+                    <a16:rowId xmlns="" xmlns:a16="http://schemas.microsoft.com/office/drawing/2014/main" val="10001"/>
                   </a:ext>
                 </a:extLst>
               </a:tr>
@@ -32611,7 +32759,7 @@
           <p:cNvPr id="26" name="직사각형 25">
             <a:extLst>
               <a:ext uri="{FF2B5EF4-FFF2-40B4-BE49-F238E27FC236}">
-                <a16:creationId xmlns:a16="http://schemas.microsoft.com/office/drawing/2014/main" xmlns="" id="{7C9E9366-B86C-4147-AAEA-0E8C98D7DA95}"/>
+                <a16:creationId xmlns="" xmlns:a16="http://schemas.microsoft.com/office/drawing/2014/main" id="{7C9E9366-B86C-4147-AAEA-0E8C98D7DA95}"/>
               </a:ext>
             </a:extLst>
           </p:cNvPr>
@@ -33118,14 +33266,14 @@
                 <a:gridCol w="280507">
                   <a:extLst>
                     <a:ext uri="{9D8B030D-6E8A-4147-A177-3AD203B41FA5}">
-                      <a16:colId xmlns:a16="http://schemas.microsoft.com/office/drawing/2014/main" xmlns="" val="20000"/>
+                      <a16:colId xmlns="" xmlns:a16="http://schemas.microsoft.com/office/drawing/2014/main" val="20000"/>
                     </a:ext>
                   </a:extLst>
                 </a:gridCol>
                 <a:gridCol w="2407792">
                   <a:extLst>
                     <a:ext uri="{9D8B030D-6E8A-4147-A177-3AD203B41FA5}">
-                      <a16:colId xmlns:a16="http://schemas.microsoft.com/office/drawing/2014/main" xmlns="" val="20001"/>
+                      <a16:colId xmlns="" xmlns:a16="http://schemas.microsoft.com/office/drawing/2014/main" val="20001"/>
                     </a:ext>
                   </a:extLst>
                 </a:gridCol>
@@ -33179,7 +33327,7 @@
                 </a:tc>
                 <a:extLst>
                   <a:ext uri="{0D108BD9-81ED-4DB2-BD59-A6C34878D82A}">
-                    <a16:rowId xmlns:a16="http://schemas.microsoft.com/office/drawing/2014/main" xmlns="" val="10000"/>
+                    <a16:rowId xmlns="" xmlns:a16="http://schemas.microsoft.com/office/drawing/2014/main" val="10000"/>
                   </a:ext>
                 </a:extLst>
               </a:tr>
@@ -33324,7 +33472,7 @@
                 </a:tc>
                 <a:extLst>
                   <a:ext uri="{0D108BD9-81ED-4DB2-BD59-A6C34878D82A}">
-                    <a16:rowId xmlns:a16="http://schemas.microsoft.com/office/drawing/2014/main" xmlns="" val="10001"/>
+                    <a16:rowId xmlns="" xmlns:a16="http://schemas.microsoft.com/office/drawing/2014/main" val="10001"/>
                   </a:ext>
                 </a:extLst>
               </a:tr>
@@ -34465,7 +34613,7 @@
                 <a:gridCol w="2688299">
                   <a:extLst>
                     <a:ext uri="{9D8B030D-6E8A-4147-A177-3AD203B41FA5}">
-                      <a16:colId xmlns:a16="http://schemas.microsoft.com/office/drawing/2014/main" xmlns="" val="20000"/>
+                      <a16:colId xmlns="" xmlns:a16="http://schemas.microsoft.com/office/drawing/2014/main" val="20000"/>
                     </a:ext>
                   </a:extLst>
                 </a:gridCol>
@@ -34497,7 +34645,7 @@
                 </a:tc>
                 <a:extLst>
                   <a:ext uri="{0D108BD9-81ED-4DB2-BD59-A6C34878D82A}">
-                    <a16:rowId xmlns:a16="http://schemas.microsoft.com/office/drawing/2014/main" xmlns="" val="10000"/>
+                    <a16:rowId xmlns="" xmlns:a16="http://schemas.microsoft.com/office/drawing/2014/main" val="10000"/>
                   </a:ext>
                 </a:extLst>
               </a:tr>
@@ -34549,7 +34697,7 @@
                 </a:tc>
                 <a:extLst>
                   <a:ext uri="{0D108BD9-81ED-4DB2-BD59-A6C34878D82A}">
-                    <a16:rowId xmlns:a16="http://schemas.microsoft.com/office/drawing/2014/main" xmlns="" val="10001"/>
+                    <a16:rowId xmlns="" xmlns:a16="http://schemas.microsoft.com/office/drawing/2014/main" val="10001"/>
                   </a:ext>
                 </a:extLst>
               </a:tr>
@@ -34611,7 +34759,7 @@
           <p:cNvPr id="3" name="직사각형 2">
             <a:extLst>
               <a:ext uri="{FF2B5EF4-FFF2-40B4-BE49-F238E27FC236}">
-                <a16:creationId xmlns:a16="http://schemas.microsoft.com/office/drawing/2014/main" xmlns="" id="{7C9E9366-B86C-4147-AAEA-0E8C98D7DA95}"/>
+                <a16:creationId xmlns="" xmlns:a16="http://schemas.microsoft.com/office/drawing/2014/main" id="{7C9E9366-B86C-4147-AAEA-0E8C98D7DA95}"/>
               </a:ext>
             </a:extLst>
           </p:cNvPr>
@@ -36468,14 +36616,14 @@
                 <a:gridCol w="280507">
                   <a:extLst>
                     <a:ext uri="{9D8B030D-6E8A-4147-A177-3AD203B41FA5}">
-                      <a16:colId xmlns:a16="http://schemas.microsoft.com/office/drawing/2014/main" xmlns="" val="20000"/>
+                      <a16:colId xmlns="" xmlns:a16="http://schemas.microsoft.com/office/drawing/2014/main" val="20000"/>
                     </a:ext>
                   </a:extLst>
                 </a:gridCol>
                 <a:gridCol w="2407792">
                   <a:extLst>
                     <a:ext uri="{9D8B030D-6E8A-4147-A177-3AD203B41FA5}">
-                      <a16:colId xmlns:a16="http://schemas.microsoft.com/office/drawing/2014/main" xmlns="" val="20001"/>
+                      <a16:colId xmlns="" xmlns:a16="http://schemas.microsoft.com/office/drawing/2014/main" val="20001"/>
                     </a:ext>
                   </a:extLst>
                 </a:gridCol>
@@ -36529,7 +36677,7 @@
                 </a:tc>
                 <a:extLst>
                   <a:ext uri="{0D108BD9-81ED-4DB2-BD59-A6C34878D82A}">
-                    <a16:rowId xmlns:a16="http://schemas.microsoft.com/office/drawing/2014/main" xmlns="" val="10000"/>
+                    <a16:rowId xmlns="" xmlns:a16="http://schemas.microsoft.com/office/drawing/2014/main" val="10000"/>
                   </a:ext>
                 </a:extLst>
               </a:tr>
@@ -36631,7 +36779,7 @@
                 </a:tc>
                 <a:extLst>
                   <a:ext uri="{0D108BD9-81ED-4DB2-BD59-A6C34878D82A}">
-                    <a16:rowId xmlns:a16="http://schemas.microsoft.com/office/drawing/2014/main" xmlns="" val="10001"/>
+                    <a16:rowId xmlns="" xmlns:a16="http://schemas.microsoft.com/office/drawing/2014/main" val="10001"/>
                   </a:ext>
                 </a:extLst>
               </a:tr>
@@ -36736,7 +36884,7 @@
                 </a:tc>
                 <a:extLst>
                   <a:ext uri="{0D108BD9-81ED-4DB2-BD59-A6C34878D82A}">
-                    <a16:rowId xmlns:a16="http://schemas.microsoft.com/office/drawing/2014/main" xmlns="" val="10002"/>
+                    <a16:rowId xmlns="" xmlns:a16="http://schemas.microsoft.com/office/drawing/2014/main" val="10002"/>
                   </a:ext>
                 </a:extLst>
               </a:tr>
@@ -37857,7 +38005,7 @@
                 <a:gridCol w="2688299">
                   <a:extLst>
                     <a:ext uri="{9D8B030D-6E8A-4147-A177-3AD203B41FA5}">
-                      <a16:colId xmlns:a16="http://schemas.microsoft.com/office/drawing/2014/main" xmlns="" val="20000"/>
+                      <a16:colId xmlns="" xmlns:a16="http://schemas.microsoft.com/office/drawing/2014/main" val="20000"/>
                     </a:ext>
                   </a:extLst>
                 </a:gridCol>
@@ -37889,7 +38037,7 @@
                 </a:tc>
                 <a:extLst>
                   <a:ext uri="{0D108BD9-81ED-4DB2-BD59-A6C34878D82A}">
-                    <a16:rowId xmlns:a16="http://schemas.microsoft.com/office/drawing/2014/main" xmlns="" val="10000"/>
+                    <a16:rowId xmlns="" xmlns:a16="http://schemas.microsoft.com/office/drawing/2014/main" val="10000"/>
                   </a:ext>
                 </a:extLst>
               </a:tr>
@@ -37941,7 +38089,7 @@
                 </a:tc>
                 <a:extLst>
                   <a:ext uri="{0D108BD9-81ED-4DB2-BD59-A6C34878D82A}">
-                    <a16:rowId xmlns:a16="http://schemas.microsoft.com/office/drawing/2014/main" xmlns="" val="10001"/>
+                    <a16:rowId xmlns="" xmlns:a16="http://schemas.microsoft.com/office/drawing/2014/main" val="10001"/>
                   </a:ext>
                 </a:extLst>
               </a:tr>
@@ -38084,14 +38232,14 @@
                 <a:gridCol w="280507">
                   <a:extLst>
                     <a:ext uri="{9D8B030D-6E8A-4147-A177-3AD203B41FA5}">
-                      <a16:colId xmlns:a16="http://schemas.microsoft.com/office/drawing/2014/main" xmlns="" val="20000"/>
+                      <a16:colId xmlns="" xmlns:a16="http://schemas.microsoft.com/office/drawing/2014/main" val="20000"/>
                     </a:ext>
                   </a:extLst>
                 </a:gridCol>
                 <a:gridCol w="2407792">
                   <a:extLst>
                     <a:ext uri="{9D8B030D-6E8A-4147-A177-3AD203B41FA5}">
-                      <a16:colId xmlns:a16="http://schemas.microsoft.com/office/drawing/2014/main" xmlns="" val="20001"/>
+                      <a16:colId xmlns="" xmlns:a16="http://schemas.microsoft.com/office/drawing/2014/main" val="20001"/>
                     </a:ext>
                   </a:extLst>
                 </a:gridCol>
@@ -38145,7 +38293,7 @@
                 </a:tc>
                 <a:extLst>
                   <a:ext uri="{0D108BD9-81ED-4DB2-BD59-A6C34878D82A}">
-                    <a16:rowId xmlns:a16="http://schemas.microsoft.com/office/drawing/2014/main" xmlns="" val="10000"/>
+                    <a16:rowId xmlns="" xmlns:a16="http://schemas.microsoft.com/office/drawing/2014/main" val="10000"/>
                   </a:ext>
                 </a:extLst>
               </a:tr>
@@ -38247,7 +38395,7 @@
                 </a:tc>
                 <a:extLst>
                   <a:ext uri="{0D108BD9-81ED-4DB2-BD59-A6C34878D82A}">
-                    <a16:rowId xmlns:a16="http://schemas.microsoft.com/office/drawing/2014/main" xmlns="" val="10001"/>
+                    <a16:rowId xmlns="" xmlns:a16="http://schemas.microsoft.com/office/drawing/2014/main" val="10001"/>
                   </a:ext>
                 </a:extLst>
               </a:tr>
@@ -38352,7 +38500,7 @@
                 </a:tc>
                 <a:extLst>
                   <a:ext uri="{0D108BD9-81ED-4DB2-BD59-A6C34878D82A}">
-                    <a16:rowId xmlns:a16="http://schemas.microsoft.com/office/drawing/2014/main" xmlns="" val="10002"/>
+                    <a16:rowId xmlns="" xmlns:a16="http://schemas.microsoft.com/office/drawing/2014/main" val="10002"/>
                   </a:ext>
                 </a:extLst>
               </a:tr>
@@ -38455,7 +38603,7 @@
           <p:cNvPr id="26" name="직사각형 25">
             <a:extLst>
               <a:ext uri="{FF2B5EF4-FFF2-40B4-BE49-F238E27FC236}">
-                <a16:creationId xmlns:a16="http://schemas.microsoft.com/office/drawing/2014/main" xmlns="" id="{7C9E9366-B86C-4147-AAEA-0E8C98D7DA95}"/>
+                <a16:creationId xmlns="" xmlns:a16="http://schemas.microsoft.com/office/drawing/2014/main" id="{7C9E9366-B86C-4147-AAEA-0E8C98D7DA95}"/>
               </a:ext>
             </a:extLst>
           </p:cNvPr>
@@ -41523,7 +41671,7 @@
                 <a:gridCol w="2688299">
                   <a:extLst>
                     <a:ext uri="{9D8B030D-6E8A-4147-A177-3AD203B41FA5}">
-                      <a16:colId xmlns:a16="http://schemas.microsoft.com/office/drawing/2014/main" xmlns="" val="20000"/>
+                      <a16:colId xmlns="" xmlns:a16="http://schemas.microsoft.com/office/drawing/2014/main" val="20000"/>
                     </a:ext>
                   </a:extLst>
                 </a:gridCol>
@@ -41555,7 +41703,7 @@
                 </a:tc>
                 <a:extLst>
                   <a:ext uri="{0D108BD9-81ED-4DB2-BD59-A6C34878D82A}">
-                    <a16:rowId xmlns:a16="http://schemas.microsoft.com/office/drawing/2014/main" xmlns="" val="10000"/>
+                    <a16:rowId xmlns="" xmlns:a16="http://schemas.microsoft.com/office/drawing/2014/main" val="10000"/>
                   </a:ext>
                 </a:extLst>
               </a:tr>
@@ -41583,7 +41731,7 @@
                 </a:tc>
                 <a:extLst>
                   <a:ext uri="{0D108BD9-81ED-4DB2-BD59-A6C34878D82A}">
-                    <a16:rowId xmlns:a16="http://schemas.microsoft.com/office/drawing/2014/main" xmlns="" val="10001"/>
+                    <a16:rowId xmlns="" xmlns:a16="http://schemas.microsoft.com/office/drawing/2014/main" val="10001"/>
                   </a:ext>
                 </a:extLst>
               </a:tr>
@@ -41815,14 +41963,14 @@
           <p:nvPr>
             <p:extLst>
               <p:ext uri="{D42A27DB-BD31-4B8C-83A1-F6EECF244321}">
-                <p14:modId xmlns:p14="http://schemas.microsoft.com/office/powerpoint/2010/main" val="1073351992"/>
+                <p14:modId xmlns:p14="http://schemas.microsoft.com/office/powerpoint/2010/main" val="2183049959"/>
               </p:ext>
             </p:extLst>
           </p:nvPr>
         </p:nvGraphicFramePr>
         <p:xfrm>
           <a:off x="2125960" y="2687665"/>
-          <a:ext cx="5808134" cy="1854200"/>
+          <a:ext cx="5808135" cy="1854200"/>
         </p:xfrm>
         <a:graphic>
           <a:graphicData uri="http://schemas.openxmlformats.org/drawingml/2006/table">
@@ -41832,8 +41980,9 @@
               </a:tblPr>
               <a:tblGrid>
                 <a:gridCol w="694268"/>
-                <a:gridCol w="2895600"/>
-                <a:gridCol w="1185707"/>
+                <a:gridCol w="2319039"/>
+                <a:gridCol w="745067"/>
+                <a:gridCol w="1017202"/>
                 <a:gridCol w="1032559"/>
               </a:tblGrid>
               <a:tr h="370840">
@@ -41910,6 +42059,67 @@
                           <a:ea typeface="+mn-ea"/>
                         </a:rPr>
                         <a:t>제목</a:t>
+                      </a:r>
+                      <a:endParaRPr lang="ko-KR" altLang="en-US" b="1" dirty="0">
+                        <a:latin typeface="+mn-ea"/>
+                        <a:ea typeface="+mn-ea"/>
+                      </a:endParaRPr>
+                    </a:p>
+                  </a:txBody>
+                  <a:tcPr anchor="ctr">
+                    <a:lnL w="12700" cap="flat" cmpd="sng" algn="ctr">
+                      <a:solidFill>
+                        <a:schemeClr val="tx1"/>
+                      </a:solidFill>
+                      <a:prstDash val="solid"/>
+                      <a:round/>
+                      <a:headEnd type="none" w="med" len="med"/>
+                      <a:tailEnd type="none" w="med" len="med"/>
+                    </a:lnL>
+                    <a:lnR w="12700" cap="flat" cmpd="sng" algn="ctr">
+                      <a:solidFill>
+                        <a:schemeClr val="tx1"/>
+                      </a:solidFill>
+                      <a:prstDash val="solid"/>
+                      <a:round/>
+                      <a:headEnd type="none" w="med" len="med"/>
+                      <a:tailEnd type="none" w="med" len="med"/>
+                    </a:lnR>
+                    <a:lnT w="12700" cap="flat" cmpd="sng" algn="ctr">
+                      <a:solidFill>
+                        <a:schemeClr val="tx1"/>
+                      </a:solidFill>
+                      <a:prstDash val="solid"/>
+                      <a:round/>
+                      <a:headEnd type="none" w="med" len="med"/>
+                      <a:tailEnd type="none" w="med" len="med"/>
+                    </a:lnT>
+                    <a:lnB w="12700" cap="flat" cmpd="sng" algn="ctr">
+                      <a:solidFill>
+                        <a:schemeClr val="tx1"/>
+                      </a:solidFill>
+                      <a:prstDash val="solid"/>
+                      <a:round/>
+                      <a:headEnd type="none" w="med" len="med"/>
+                      <a:tailEnd type="none" w="med" len="med"/>
+                    </a:lnB>
+                    <a:solidFill>
+                      <a:srgbClr val="FF9E00"/>
+                    </a:solidFill>
+                  </a:tcPr>
+                </a:tc>
+                <a:tc>
+                  <a:txBody>
+                    <a:bodyPr/>
+                    <a:lstStyle/>
+                    <a:p>
+                      <a:pPr algn="ctr" latinLnBrk="1"/>
+                      <a:r>
+                        <a:rPr lang="ko-KR" altLang="en-US" b="1" dirty="0" smtClean="0">
+                          <a:latin typeface="+mn-ea"/>
+                          <a:ea typeface="+mn-ea"/>
+                        </a:rPr>
+                        <a:t>중요</a:t>
                       </a:r>
                       <a:endParaRPr lang="ko-KR" altLang="en-US" b="1" dirty="0">
                         <a:latin typeface="+mn-ea"/>
@@ -42206,6 +42416,64 @@
                     <a:p>
                       <a:pPr algn="ctr" latinLnBrk="1"/>
                       <a:r>
+                        <a:rPr lang="en-US" altLang="ko-KR" sz="1600" dirty="0" smtClean="0">
+                          <a:latin typeface="+mn-ea"/>
+                          <a:ea typeface="+mn-ea"/>
+                        </a:rPr>
+                        <a:t>Y</a:t>
+                      </a:r>
+                      <a:endParaRPr lang="ko-KR" altLang="en-US" sz="1600" dirty="0">
+                        <a:latin typeface="+mn-ea"/>
+                        <a:ea typeface="+mn-ea"/>
+                      </a:endParaRPr>
+                    </a:p>
+                  </a:txBody>
+                  <a:tcPr anchor="ctr">
+                    <a:lnL w="12700" cap="flat" cmpd="sng" algn="ctr">
+                      <a:solidFill>
+                        <a:schemeClr val="tx1"/>
+                      </a:solidFill>
+                      <a:prstDash val="solid"/>
+                      <a:round/>
+                      <a:headEnd type="none" w="med" len="med"/>
+                      <a:tailEnd type="none" w="med" len="med"/>
+                    </a:lnL>
+                    <a:lnR w="12700" cap="flat" cmpd="sng" algn="ctr">
+                      <a:solidFill>
+                        <a:schemeClr val="tx1"/>
+                      </a:solidFill>
+                      <a:prstDash val="solid"/>
+                      <a:round/>
+                      <a:headEnd type="none" w="med" len="med"/>
+                      <a:tailEnd type="none" w="med" len="med"/>
+                    </a:lnR>
+                    <a:lnT w="12700" cap="flat" cmpd="sng" algn="ctr">
+                      <a:solidFill>
+                        <a:schemeClr val="tx1"/>
+                      </a:solidFill>
+                      <a:prstDash val="solid"/>
+                      <a:round/>
+                      <a:headEnd type="none" w="med" len="med"/>
+                      <a:tailEnd type="none" w="med" len="med"/>
+                    </a:lnT>
+                    <a:lnB w="12700" cap="flat" cmpd="sng" algn="ctr">
+                      <a:solidFill>
+                        <a:schemeClr val="tx1"/>
+                      </a:solidFill>
+                      <a:prstDash val="solid"/>
+                      <a:round/>
+                      <a:headEnd type="none" w="med" len="med"/>
+                      <a:tailEnd type="none" w="med" len="med"/>
+                    </a:lnB>
+                  </a:tcPr>
+                </a:tc>
+                <a:tc>
+                  <a:txBody>
+                    <a:bodyPr/>
+                    <a:lstStyle/>
+                    <a:p>
+                      <a:pPr algn="ctr" latinLnBrk="1"/>
+                      <a:r>
                         <a:rPr lang="ko-KR" altLang="en-US" sz="1600" dirty="0" smtClean="0">
                           <a:latin typeface="+mn-ea"/>
                           <a:ea typeface="+mn-ea"/>
@@ -42440,6 +42708,64 @@
                     <a:p>
                       <a:pPr algn="ctr" latinLnBrk="1"/>
                       <a:r>
+                        <a:rPr lang="en-US" altLang="ko-KR" sz="1600" dirty="0" smtClean="0">
+                          <a:latin typeface="+mn-ea"/>
+                          <a:ea typeface="+mn-ea"/>
+                        </a:rPr>
+                        <a:t>Y</a:t>
+                      </a:r>
+                      <a:endParaRPr lang="ko-KR" altLang="en-US" sz="1600" dirty="0">
+                        <a:latin typeface="+mn-ea"/>
+                        <a:ea typeface="+mn-ea"/>
+                      </a:endParaRPr>
+                    </a:p>
+                  </a:txBody>
+                  <a:tcPr anchor="ctr">
+                    <a:lnL w="12700" cap="flat" cmpd="sng" algn="ctr">
+                      <a:solidFill>
+                        <a:schemeClr val="tx1"/>
+                      </a:solidFill>
+                      <a:prstDash val="solid"/>
+                      <a:round/>
+                      <a:headEnd type="none" w="med" len="med"/>
+                      <a:tailEnd type="none" w="med" len="med"/>
+                    </a:lnL>
+                    <a:lnR w="12700" cap="flat" cmpd="sng" algn="ctr">
+                      <a:solidFill>
+                        <a:schemeClr val="tx1"/>
+                      </a:solidFill>
+                      <a:prstDash val="solid"/>
+                      <a:round/>
+                      <a:headEnd type="none" w="med" len="med"/>
+                      <a:tailEnd type="none" w="med" len="med"/>
+                    </a:lnR>
+                    <a:lnT w="12700" cap="flat" cmpd="sng" algn="ctr">
+                      <a:solidFill>
+                        <a:schemeClr val="tx1"/>
+                      </a:solidFill>
+                      <a:prstDash val="solid"/>
+                      <a:round/>
+                      <a:headEnd type="none" w="med" len="med"/>
+                      <a:tailEnd type="none" w="med" len="med"/>
+                    </a:lnT>
+                    <a:lnB w="12700" cap="flat" cmpd="sng" algn="ctr">
+                      <a:solidFill>
+                        <a:schemeClr val="tx1"/>
+                      </a:solidFill>
+                      <a:prstDash val="solid"/>
+                      <a:round/>
+                      <a:headEnd type="none" w="med" len="med"/>
+                      <a:tailEnd type="none" w="med" len="med"/>
+                    </a:lnB>
+                  </a:tcPr>
+                </a:tc>
+                <a:tc>
+                  <a:txBody>
+                    <a:bodyPr/>
+                    <a:lstStyle/>
+                    <a:p>
+                      <a:pPr algn="ctr" latinLnBrk="1"/>
+                      <a:r>
                         <a:rPr lang="ko-KR" altLang="en-US" sz="1600" dirty="0" smtClean="0">
                           <a:latin typeface="+mn-ea"/>
                           <a:ea typeface="+mn-ea"/>
@@ -42674,6 +43000,64 @@
                     <a:p>
                       <a:pPr algn="ctr" latinLnBrk="1"/>
                       <a:r>
+                        <a:rPr lang="en-US" altLang="ko-KR" sz="1600" dirty="0" smtClean="0">
+                          <a:latin typeface="+mn-ea"/>
+                          <a:ea typeface="+mn-ea"/>
+                        </a:rPr>
+                        <a:t>N</a:t>
+                      </a:r>
+                      <a:endParaRPr lang="ko-KR" altLang="en-US" sz="1600" dirty="0">
+                        <a:latin typeface="+mn-ea"/>
+                        <a:ea typeface="+mn-ea"/>
+                      </a:endParaRPr>
+                    </a:p>
+                  </a:txBody>
+                  <a:tcPr anchor="ctr">
+                    <a:lnL w="12700" cap="flat" cmpd="sng" algn="ctr">
+                      <a:solidFill>
+                        <a:schemeClr val="tx1"/>
+                      </a:solidFill>
+                      <a:prstDash val="solid"/>
+                      <a:round/>
+                      <a:headEnd type="none" w="med" len="med"/>
+                      <a:tailEnd type="none" w="med" len="med"/>
+                    </a:lnL>
+                    <a:lnR w="12700" cap="flat" cmpd="sng" algn="ctr">
+                      <a:solidFill>
+                        <a:schemeClr val="tx1"/>
+                      </a:solidFill>
+                      <a:prstDash val="solid"/>
+                      <a:round/>
+                      <a:headEnd type="none" w="med" len="med"/>
+                      <a:tailEnd type="none" w="med" len="med"/>
+                    </a:lnR>
+                    <a:lnT w="12700" cap="flat" cmpd="sng" algn="ctr">
+                      <a:solidFill>
+                        <a:schemeClr val="tx1"/>
+                      </a:solidFill>
+                      <a:prstDash val="solid"/>
+                      <a:round/>
+                      <a:headEnd type="none" w="med" len="med"/>
+                      <a:tailEnd type="none" w="med" len="med"/>
+                    </a:lnT>
+                    <a:lnB w="12700" cap="flat" cmpd="sng" algn="ctr">
+                      <a:solidFill>
+                        <a:schemeClr val="tx1"/>
+                      </a:solidFill>
+                      <a:prstDash val="solid"/>
+                      <a:round/>
+                      <a:headEnd type="none" w="med" len="med"/>
+                      <a:tailEnd type="none" w="med" len="med"/>
+                    </a:lnB>
+                  </a:tcPr>
+                </a:tc>
+                <a:tc>
+                  <a:txBody>
+                    <a:bodyPr/>
+                    <a:lstStyle/>
+                    <a:p>
+                      <a:pPr algn="ctr" latinLnBrk="1"/>
+                      <a:r>
                         <a:rPr lang="ko-KR" altLang="en-US" sz="1600" dirty="0" smtClean="0">
                           <a:latin typeface="+mn-ea"/>
                           <a:ea typeface="+mn-ea"/>
@@ -42855,6 +43239,64 @@
                           <a:ea typeface="+mn-ea"/>
                         </a:rPr>
                         <a:t>제목</a:t>
+                      </a:r>
+                      <a:endParaRPr lang="ko-KR" altLang="en-US" sz="1600" dirty="0">
+                        <a:latin typeface="+mn-ea"/>
+                        <a:ea typeface="+mn-ea"/>
+                      </a:endParaRPr>
+                    </a:p>
+                  </a:txBody>
+                  <a:tcPr anchor="ctr">
+                    <a:lnL w="12700" cap="flat" cmpd="sng" algn="ctr">
+                      <a:solidFill>
+                        <a:schemeClr val="tx1"/>
+                      </a:solidFill>
+                      <a:prstDash val="solid"/>
+                      <a:round/>
+                      <a:headEnd type="none" w="med" len="med"/>
+                      <a:tailEnd type="none" w="med" len="med"/>
+                    </a:lnL>
+                    <a:lnR w="12700" cap="flat" cmpd="sng" algn="ctr">
+                      <a:solidFill>
+                        <a:schemeClr val="tx1"/>
+                      </a:solidFill>
+                      <a:prstDash val="solid"/>
+                      <a:round/>
+                      <a:headEnd type="none" w="med" len="med"/>
+                      <a:tailEnd type="none" w="med" len="med"/>
+                    </a:lnR>
+                    <a:lnT w="12700" cap="flat" cmpd="sng" algn="ctr">
+                      <a:solidFill>
+                        <a:schemeClr val="tx1"/>
+                      </a:solidFill>
+                      <a:prstDash val="solid"/>
+                      <a:round/>
+                      <a:headEnd type="none" w="med" len="med"/>
+                      <a:tailEnd type="none" w="med" len="med"/>
+                    </a:lnT>
+                    <a:lnB w="12700" cap="flat" cmpd="sng" algn="ctr">
+                      <a:solidFill>
+                        <a:schemeClr val="tx1"/>
+                      </a:solidFill>
+                      <a:prstDash val="solid"/>
+                      <a:round/>
+                      <a:headEnd type="none" w="med" len="med"/>
+                      <a:tailEnd type="none" w="med" len="med"/>
+                    </a:lnB>
+                  </a:tcPr>
+                </a:tc>
+                <a:tc>
+                  <a:txBody>
+                    <a:bodyPr/>
+                    <a:lstStyle/>
+                    <a:p>
+                      <a:pPr algn="ctr" latinLnBrk="1"/>
+                      <a:r>
+                        <a:rPr lang="en-US" altLang="ko-KR" sz="1600" dirty="0" smtClean="0">
+                          <a:latin typeface="+mn-ea"/>
+                          <a:ea typeface="+mn-ea"/>
+                        </a:rPr>
+                        <a:t>N</a:t>
                       </a:r>
                       <a:endParaRPr lang="ko-KR" altLang="en-US" sz="1600" dirty="0">
                         <a:latin typeface="+mn-ea"/>
@@ -43218,14 +43660,14 @@
                 <a:gridCol w="280507">
                   <a:extLst>
                     <a:ext uri="{9D8B030D-6E8A-4147-A177-3AD203B41FA5}">
-                      <a16:colId xmlns:a16="http://schemas.microsoft.com/office/drawing/2014/main" xmlns="" val="20000"/>
+                      <a16:colId xmlns="" xmlns:a16="http://schemas.microsoft.com/office/drawing/2014/main" val="20000"/>
                     </a:ext>
                   </a:extLst>
                 </a:gridCol>
                 <a:gridCol w="2407792">
                   <a:extLst>
                     <a:ext uri="{9D8B030D-6E8A-4147-A177-3AD203B41FA5}">
-                      <a16:colId xmlns:a16="http://schemas.microsoft.com/office/drawing/2014/main" xmlns="" val="20001"/>
+                      <a16:colId xmlns="" xmlns:a16="http://schemas.microsoft.com/office/drawing/2014/main" val="20001"/>
                     </a:ext>
                   </a:extLst>
                 </a:gridCol>
@@ -43279,7 +43721,7 @@
                 </a:tc>
                 <a:extLst>
                   <a:ext uri="{0D108BD9-81ED-4DB2-BD59-A6C34878D82A}">
-                    <a16:rowId xmlns:a16="http://schemas.microsoft.com/office/drawing/2014/main" xmlns="" val="10000"/>
+                    <a16:rowId xmlns="" xmlns:a16="http://schemas.microsoft.com/office/drawing/2014/main" val="10000"/>
                   </a:ext>
                 </a:extLst>
               </a:tr>
@@ -43357,7 +43799,7 @@
                 </a:tc>
                 <a:extLst>
                   <a:ext uri="{0D108BD9-81ED-4DB2-BD59-A6C34878D82A}">
-                    <a16:rowId xmlns:a16="http://schemas.microsoft.com/office/drawing/2014/main" xmlns="" val="10001"/>
+                    <a16:rowId xmlns="" xmlns:a16="http://schemas.microsoft.com/office/drawing/2014/main" val="10001"/>
                   </a:ext>
                 </a:extLst>
               </a:tr>
@@ -43450,7 +43892,7 @@
                 </a:tc>
                 <a:extLst>
                   <a:ext uri="{0D108BD9-81ED-4DB2-BD59-A6C34878D82A}">
-                    <a16:rowId xmlns:a16="http://schemas.microsoft.com/office/drawing/2014/main" xmlns="" val="10002"/>
+                    <a16:rowId xmlns="" xmlns:a16="http://schemas.microsoft.com/office/drawing/2014/main" val="10002"/>
                   </a:ext>
                 </a:extLst>
               </a:tr>
@@ -43553,7 +43995,7 @@
           <p:cNvPr id="25" name="직사각형 24">
             <a:extLst>
               <a:ext uri="{FF2B5EF4-FFF2-40B4-BE49-F238E27FC236}">
-                <a16:creationId xmlns:a16="http://schemas.microsoft.com/office/drawing/2014/main" xmlns="" id="{7C9E9366-B86C-4147-AAEA-0E8C98D7DA95}"/>
+                <a16:creationId xmlns="" xmlns:a16="http://schemas.microsoft.com/office/drawing/2014/main" id="{7C9E9366-B86C-4147-AAEA-0E8C98D7DA95}"/>
               </a:ext>
             </a:extLst>
           </p:cNvPr>
@@ -44697,16 +45139,7 @@
                 </a:solidFill>
                 <a:latin typeface="+mn-ea"/>
               </a:rPr>
-              <a:t>공지사항 </a:t>
-            </a:r>
-            <a:r>
-              <a:rPr lang="ko-KR" altLang="en-US" dirty="0" smtClean="0">
-                <a:solidFill>
-                  <a:schemeClr val="tx1"/>
-                </a:solidFill>
-                <a:latin typeface="+mn-ea"/>
-              </a:rPr>
-              <a:t>등록</a:t>
+              <a:t>공지사항 등록</a:t>
             </a:r>
             <a:endParaRPr lang="en-US" altLang="ko-KR" dirty="0" smtClean="0">
               <a:solidFill>
@@ -44830,7 +45263,7 @@
           <p:cNvPr id="25" name="직사각형 24">
             <a:extLst>
               <a:ext uri="{FF2B5EF4-FFF2-40B4-BE49-F238E27FC236}">
-                <a16:creationId xmlns:a16="http://schemas.microsoft.com/office/drawing/2014/main" xmlns="" id="{7C9E9366-B86C-4147-AAEA-0E8C98D7DA95}"/>
+                <a16:creationId xmlns="" xmlns:a16="http://schemas.microsoft.com/office/drawing/2014/main" id="{7C9E9366-B86C-4147-AAEA-0E8C98D7DA95}"/>
               </a:ext>
             </a:extLst>
           </p:cNvPr>
@@ -44948,7 +45381,7 @@
           <p:nvPr>
             <p:extLst>
               <p:ext uri="{D42A27DB-BD31-4B8C-83A1-F6EECF244321}">
-                <p14:modId xmlns:p14="http://schemas.microsoft.com/office/powerpoint/2010/main" val="1364050240"/>
+                <p14:modId xmlns:p14="http://schemas.microsoft.com/office/powerpoint/2010/main" val="2656276696"/>
               </p:ext>
             </p:extLst>
           </p:nvPr>
@@ -44965,7 +45398,9 @@
               </a:tblPr>
               <a:tblGrid>
                 <a:gridCol w="1080000"/>
-                <a:gridCol w="4320000"/>
+                <a:gridCol w="2191358"/>
+                <a:gridCol w="753533"/>
+                <a:gridCol w="1375109"/>
               </a:tblGrid>
               <a:tr h="360000">
                 <a:tc>
@@ -45076,6 +45511,126 @@
                     <a:noFill/>
                   </a:tcPr>
                 </a:tc>
+                <a:tc>
+                  <a:txBody>
+                    <a:bodyPr/>
+                    <a:lstStyle/>
+                    <a:p>
+                      <a:pPr algn="ctr" latinLnBrk="1"/>
+                      <a:r>
+                        <a:rPr kumimoji="0" lang="ko-KR" altLang="en-US" sz="1800" b="0" i="0" u="none" strike="noStrike" kern="1200" cap="none" spc="0" normalizeH="0" baseline="0" noProof="0" dirty="0" smtClean="0">
+                          <a:ln>
+                            <a:noFill/>
+                          </a:ln>
+                          <a:solidFill>
+                            <a:prstClr val="black"/>
+                          </a:solidFill>
+                          <a:effectLst/>
+                          <a:uLnTx/>
+                          <a:uFillTx/>
+                          <a:latin typeface="+mn-lt"/>
+                          <a:ea typeface="+mn-ea"/>
+                        </a:rPr>
+                        <a:t>중요</a:t>
+                      </a:r>
+                      <a:endParaRPr lang="ko-KR" altLang="en-US" sz="1400" dirty="0"/>
+                    </a:p>
+                  </a:txBody>
+                  <a:tcPr anchor="ctr">
+                    <a:lnL w="12700" cap="flat" cmpd="sng" algn="ctr">
+                      <a:solidFill>
+                        <a:schemeClr val="tx1"/>
+                      </a:solidFill>
+                      <a:prstDash val="solid"/>
+                      <a:round/>
+                      <a:headEnd type="none" w="med" len="med"/>
+                      <a:tailEnd type="none" w="med" len="med"/>
+                    </a:lnL>
+                    <a:lnR w="12700" cap="flat" cmpd="sng" algn="ctr">
+                      <a:solidFill>
+                        <a:schemeClr val="tx1"/>
+                      </a:solidFill>
+                      <a:prstDash val="solid"/>
+                      <a:round/>
+                      <a:headEnd type="none" w="med" len="med"/>
+                      <a:tailEnd type="none" w="med" len="med"/>
+                    </a:lnR>
+                    <a:lnT w="12700" cap="flat" cmpd="sng" algn="ctr">
+                      <a:solidFill>
+                        <a:schemeClr val="tx1"/>
+                      </a:solidFill>
+                      <a:prstDash val="solid"/>
+                      <a:round/>
+                      <a:headEnd type="none" w="med" len="med"/>
+                      <a:tailEnd type="none" w="med" len="med"/>
+                    </a:lnT>
+                    <a:lnB w="12700" cap="flat" cmpd="sng" algn="ctr">
+                      <a:solidFill>
+                        <a:schemeClr val="tx1"/>
+                      </a:solidFill>
+                      <a:prstDash val="solid"/>
+                      <a:round/>
+                      <a:headEnd type="none" w="med" len="med"/>
+                      <a:tailEnd type="none" w="med" len="med"/>
+                    </a:lnB>
+                    <a:solidFill>
+                      <a:srgbClr val="FF9E00"/>
+                    </a:solidFill>
+                  </a:tcPr>
+                </a:tc>
+                <a:tc>
+                  <a:txBody>
+                    <a:bodyPr/>
+                    <a:lstStyle/>
+                    <a:p>
+                      <a:pPr latinLnBrk="1"/>
+                      <a:r>
+                        <a:rPr lang="en-US" altLang="ko-KR" sz="1400" dirty="0" smtClean="0"/>
+                        <a:t>Y / N</a:t>
+                      </a:r>
+                      <a:endParaRPr lang="ko-KR" altLang="en-US" sz="1400" dirty="0"/>
+                    </a:p>
+                  </a:txBody>
+                  <a:tcPr anchor="ctr">
+                    <a:lnL w="12700" cap="flat" cmpd="sng" algn="ctr">
+                      <a:solidFill>
+                        <a:schemeClr val="tx1"/>
+                      </a:solidFill>
+                      <a:prstDash val="solid"/>
+                      <a:round/>
+                      <a:headEnd type="none" w="med" len="med"/>
+                      <a:tailEnd type="none" w="med" len="med"/>
+                    </a:lnL>
+                    <a:lnR w="12700" cap="flat" cmpd="sng" algn="ctr">
+                      <a:solidFill>
+                        <a:schemeClr val="tx1"/>
+                      </a:solidFill>
+                      <a:prstDash val="solid"/>
+                      <a:round/>
+                      <a:headEnd type="none" w="med" len="med"/>
+                      <a:tailEnd type="none" w="med" len="med"/>
+                    </a:lnR>
+                    <a:lnT w="12700" cap="flat" cmpd="sng" algn="ctr">
+                      <a:solidFill>
+                        <a:schemeClr val="tx1"/>
+                      </a:solidFill>
+                      <a:prstDash val="solid"/>
+                      <a:round/>
+                      <a:headEnd type="none" w="med" len="med"/>
+                      <a:tailEnd type="none" w="med" len="med"/>
+                    </a:lnT>
+                    <a:lnB w="12700" cap="flat" cmpd="sng" algn="ctr">
+                      <a:solidFill>
+                        <a:schemeClr val="tx1"/>
+                      </a:solidFill>
+                      <a:prstDash val="solid"/>
+                      <a:round/>
+                      <a:headEnd type="none" w="med" len="med"/>
+                      <a:tailEnd type="none" w="med" len="med"/>
+                    </a:lnB>
+                    <a:noFill/>
+                  </a:tcPr>
+                </a:tc>
               </a:tr>
               <a:tr h="1728000">
                 <a:tc>
@@ -45133,7 +45688,7 @@
                     </a:solidFill>
                   </a:tcPr>
                 </a:tc>
-                <a:tc>
+                <a:tc gridSpan="3">
                   <a:txBody>
                     <a:bodyPr/>
                     <a:lstStyle/>
@@ -45143,6 +45698,66 @@
                         <a:rPr lang="ko-KR" altLang="en-US" sz="1400" dirty="0" smtClean="0"/>
                         <a:t>공지사항 내용</a:t>
                       </a:r>
+                      <a:endParaRPr lang="ko-KR" altLang="en-US" sz="1400" dirty="0"/>
+                    </a:p>
+                  </a:txBody>
+                  <a:tcPr>
+                    <a:lnL w="12700" cap="flat" cmpd="sng" algn="ctr">
+                      <a:solidFill>
+                        <a:schemeClr val="tx1"/>
+                      </a:solidFill>
+                      <a:prstDash val="solid"/>
+                      <a:round/>
+                      <a:headEnd type="none" w="med" len="med"/>
+                      <a:tailEnd type="none" w="med" len="med"/>
+                    </a:lnL>
+                    <a:lnR w="12700" cap="flat" cmpd="sng" algn="ctr">
+                      <a:solidFill>
+                        <a:schemeClr val="tx1"/>
+                      </a:solidFill>
+                      <a:prstDash val="solid"/>
+                      <a:round/>
+                      <a:headEnd type="none" w="med" len="med"/>
+                      <a:tailEnd type="none" w="med" len="med"/>
+                    </a:lnR>
+                    <a:lnT w="12700" cap="flat" cmpd="sng" algn="ctr">
+                      <a:solidFill>
+                        <a:schemeClr val="tx1"/>
+                      </a:solidFill>
+                      <a:prstDash val="solid"/>
+                      <a:round/>
+                      <a:headEnd type="none" w="med" len="med"/>
+                      <a:tailEnd type="none" w="med" len="med"/>
+                    </a:lnT>
+                    <a:lnB w="12700" cap="flat" cmpd="sng" algn="ctr">
+                      <a:solidFill>
+                        <a:schemeClr val="tx1"/>
+                      </a:solidFill>
+                      <a:prstDash val="solid"/>
+                      <a:round/>
+                      <a:headEnd type="none" w="med" len="med"/>
+                      <a:tailEnd type="none" w="med" len="med"/>
+                    </a:lnB>
+                    <a:noFill/>
+                  </a:tcPr>
+                </a:tc>
+                <a:tc hMerge="1">
+                  <a:txBody>
+                    <a:bodyPr/>
+                    <a:lstStyle/>
+                    <a:p>
+                      <a:pPr latinLnBrk="1"/>
+                      <a:endParaRPr lang="ko-KR" altLang="en-US"/>
+                    </a:p>
+                  </a:txBody>
+                  <a:tcPr/>
+                </a:tc>
+                <a:tc hMerge="1">
+                  <a:txBody>
+                    <a:bodyPr/>
+                    <a:lstStyle/>
+                    <a:p>
+                      <a:pPr latinLnBrk="1"/>
                       <a:endParaRPr lang="ko-KR" altLang="en-US" sz="1400" dirty="0"/>
                     </a:p>
                   </a:txBody>
@@ -45385,14 +46000,14 @@
                 <a:gridCol w="280507">
                   <a:extLst>
                     <a:ext uri="{9D8B030D-6E8A-4147-A177-3AD203B41FA5}">
-                      <a16:colId xmlns:a16="http://schemas.microsoft.com/office/drawing/2014/main" xmlns="" val="20000"/>
+                      <a16:colId xmlns="" xmlns:a16="http://schemas.microsoft.com/office/drawing/2014/main" val="20000"/>
                     </a:ext>
                   </a:extLst>
                 </a:gridCol>
                 <a:gridCol w="2407792">
                   <a:extLst>
                     <a:ext uri="{9D8B030D-6E8A-4147-A177-3AD203B41FA5}">
-                      <a16:colId xmlns:a16="http://schemas.microsoft.com/office/drawing/2014/main" xmlns="" val="20001"/>
+                      <a16:colId xmlns="" xmlns:a16="http://schemas.microsoft.com/office/drawing/2014/main" val="20001"/>
                     </a:ext>
                   </a:extLst>
                 </a:gridCol>
@@ -45446,7 +46061,7 @@
                 </a:tc>
                 <a:extLst>
                   <a:ext uri="{0D108BD9-81ED-4DB2-BD59-A6C34878D82A}">
-                    <a16:rowId xmlns:a16="http://schemas.microsoft.com/office/drawing/2014/main" xmlns="" val="10000"/>
+                    <a16:rowId xmlns="" xmlns:a16="http://schemas.microsoft.com/office/drawing/2014/main" val="10000"/>
                   </a:ext>
                 </a:extLst>
               </a:tr>
@@ -45524,7 +46139,7 @@
                 </a:tc>
                 <a:extLst>
                   <a:ext uri="{0D108BD9-81ED-4DB2-BD59-A6C34878D82A}">
-                    <a16:rowId xmlns:a16="http://schemas.microsoft.com/office/drawing/2014/main" xmlns="" val="10001"/>
+                    <a16:rowId xmlns="" xmlns:a16="http://schemas.microsoft.com/office/drawing/2014/main" val="10001"/>
                   </a:ext>
                 </a:extLst>
               </a:tr>
@@ -45617,7 +46232,7 @@
                 </a:tc>
                 <a:extLst>
                   <a:ext uri="{0D108BD9-81ED-4DB2-BD59-A6C34878D82A}">
-                    <a16:rowId xmlns:a16="http://schemas.microsoft.com/office/drawing/2014/main" xmlns="" val="10002"/>
+                    <a16:rowId xmlns="" xmlns:a16="http://schemas.microsoft.com/office/drawing/2014/main" val="10002"/>
                   </a:ext>
                 </a:extLst>
               </a:tr>
@@ -45651,7 +46266,7 @@
                 <a:gridCol w="2688299">
                   <a:extLst>
                     <a:ext uri="{9D8B030D-6E8A-4147-A177-3AD203B41FA5}">
-                      <a16:colId xmlns:a16="http://schemas.microsoft.com/office/drawing/2014/main" xmlns="" val="20000"/>
+                      <a16:colId xmlns="" xmlns:a16="http://schemas.microsoft.com/office/drawing/2014/main" val="20000"/>
                     </a:ext>
                   </a:extLst>
                 </a:gridCol>
@@ -45683,7 +46298,7 @@
                 </a:tc>
                 <a:extLst>
                   <a:ext uri="{0D108BD9-81ED-4DB2-BD59-A6C34878D82A}">
-                    <a16:rowId xmlns:a16="http://schemas.microsoft.com/office/drawing/2014/main" xmlns="" val="10000"/>
+                    <a16:rowId xmlns="" xmlns:a16="http://schemas.microsoft.com/office/drawing/2014/main" val="10000"/>
                   </a:ext>
                 </a:extLst>
               </a:tr>
@@ -45746,7 +46361,7 @@
                 </a:tc>
                 <a:extLst>
                   <a:ext uri="{0D108BD9-81ED-4DB2-BD59-A6C34878D82A}">
-                    <a16:rowId xmlns:a16="http://schemas.microsoft.com/office/drawing/2014/main" xmlns="" val="10001"/>
+                    <a16:rowId xmlns="" xmlns:a16="http://schemas.microsoft.com/office/drawing/2014/main" val="10001"/>
                   </a:ext>
                 </a:extLst>
               </a:tr>

</xml_diff>